<commit_message>
commit for dashboard customer and location almost clean
</commit_message>
<xml_diff>
--- a/DataBase/style/style.pptx
+++ b/DataBase/style/style.pptx
@@ -6,6 +6,7 @@
   </p:sldMasterIdLst>
   <p:sldIdLst>
     <p:sldId id="256" r:id="rId2"/>
+    <p:sldId id="257" r:id="rId3"/>
   </p:sldIdLst>
   <p:sldSz cx="12192000" cy="6858000"/>
   <p:notesSz cx="6858000" cy="9144000"/>
@@ -259,7 +260,7 @@
           <a:p>
             <a:fld id="{06639CF7-1097-4C3B-8127-169A3EEBE66B}" type="datetimeFigureOut">
               <a:rPr lang="fr-FR" smtClean="0"/>
-              <a:t>29/09/2025</a:t>
+              <a:t>01/10/2025</a:t>
             </a:fld>
             <a:endParaRPr lang="fr-FR"/>
           </a:p>
@@ -457,7 +458,7 @@
           <a:p>
             <a:fld id="{06639CF7-1097-4C3B-8127-169A3EEBE66B}" type="datetimeFigureOut">
               <a:rPr lang="fr-FR" smtClean="0"/>
-              <a:t>29/09/2025</a:t>
+              <a:t>01/10/2025</a:t>
             </a:fld>
             <a:endParaRPr lang="fr-FR"/>
           </a:p>
@@ -665,7 +666,7 @@
           <a:p>
             <a:fld id="{06639CF7-1097-4C3B-8127-169A3EEBE66B}" type="datetimeFigureOut">
               <a:rPr lang="fr-FR" smtClean="0"/>
-              <a:t>29/09/2025</a:t>
+              <a:t>01/10/2025</a:t>
             </a:fld>
             <a:endParaRPr lang="fr-FR"/>
           </a:p>
@@ -863,7 +864,7 @@
           <a:p>
             <a:fld id="{06639CF7-1097-4C3B-8127-169A3EEBE66B}" type="datetimeFigureOut">
               <a:rPr lang="fr-FR" smtClean="0"/>
-              <a:t>29/09/2025</a:t>
+              <a:t>01/10/2025</a:t>
             </a:fld>
             <a:endParaRPr lang="fr-FR"/>
           </a:p>
@@ -1138,7 +1139,7 @@
           <a:p>
             <a:fld id="{06639CF7-1097-4C3B-8127-169A3EEBE66B}" type="datetimeFigureOut">
               <a:rPr lang="fr-FR" smtClean="0"/>
-              <a:t>29/09/2025</a:t>
+              <a:t>01/10/2025</a:t>
             </a:fld>
             <a:endParaRPr lang="fr-FR"/>
           </a:p>
@@ -1403,7 +1404,7 @@
           <a:p>
             <a:fld id="{06639CF7-1097-4C3B-8127-169A3EEBE66B}" type="datetimeFigureOut">
               <a:rPr lang="fr-FR" smtClean="0"/>
-              <a:t>29/09/2025</a:t>
+              <a:t>01/10/2025</a:t>
             </a:fld>
             <a:endParaRPr lang="fr-FR"/>
           </a:p>
@@ -1815,7 +1816,7 @@
           <a:p>
             <a:fld id="{06639CF7-1097-4C3B-8127-169A3EEBE66B}" type="datetimeFigureOut">
               <a:rPr lang="fr-FR" smtClean="0"/>
-              <a:t>29/09/2025</a:t>
+              <a:t>01/10/2025</a:t>
             </a:fld>
             <a:endParaRPr lang="fr-FR"/>
           </a:p>
@@ -1956,7 +1957,7 @@
           <a:p>
             <a:fld id="{06639CF7-1097-4C3B-8127-169A3EEBE66B}" type="datetimeFigureOut">
               <a:rPr lang="fr-FR" smtClean="0"/>
-              <a:t>29/09/2025</a:t>
+              <a:t>01/10/2025</a:t>
             </a:fld>
             <a:endParaRPr lang="fr-FR"/>
           </a:p>
@@ -2069,7 +2070,7 @@
           <a:p>
             <a:fld id="{06639CF7-1097-4C3B-8127-169A3EEBE66B}" type="datetimeFigureOut">
               <a:rPr lang="fr-FR" smtClean="0"/>
-              <a:t>29/09/2025</a:t>
+              <a:t>01/10/2025</a:t>
             </a:fld>
             <a:endParaRPr lang="fr-FR"/>
           </a:p>
@@ -2380,7 +2381,7 @@
           <a:p>
             <a:fld id="{06639CF7-1097-4C3B-8127-169A3EEBE66B}" type="datetimeFigureOut">
               <a:rPr lang="fr-FR" smtClean="0"/>
-              <a:t>29/09/2025</a:t>
+              <a:t>01/10/2025</a:t>
             </a:fld>
             <a:endParaRPr lang="fr-FR"/>
           </a:p>
@@ -2668,7 +2669,7 @@
           <a:p>
             <a:fld id="{06639CF7-1097-4C3B-8127-169A3EEBE66B}" type="datetimeFigureOut">
               <a:rPr lang="fr-FR" smtClean="0"/>
-              <a:t>29/09/2025</a:t>
+              <a:t>01/10/2025</a:t>
             </a:fld>
             <a:endParaRPr lang="fr-FR"/>
           </a:p>
@@ -2909,7 +2910,7 @@
           <a:p>
             <a:fld id="{06639CF7-1097-4C3B-8127-169A3EEBE66B}" type="datetimeFigureOut">
               <a:rPr lang="fr-FR" smtClean="0"/>
-              <a:t>29/09/2025</a:t>
+              <a:t>01/10/2025</a:t>
             </a:fld>
             <a:endParaRPr lang="fr-FR"/>
           </a:p>
@@ -4242,6 +4243,2622 @@
 </p:sld>
 </file>
 
+<file path=ppt/slides/slide2.xml><?xml version="1.0" encoding="utf-8"?>
+<p:sld xmlns:a="http://schemas.openxmlformats.org/drawingml/2006/main" xmlns:r="http://schemas.openxmlformats.org/officeDocument/2006/relationships" xmlns:p="http://schemas.openxmlformats.org/presentationml/2006/main">
+  <p:cSld>
+    <p:bg>
+      <p:bgPr>
+        <a:gradFill>
+          <a:gsLst>
+            <a:gs pos="23000">
+              <a:srgbClr val="C00000"/>
+            </a:gs>
+            <a:gs pos="79000">
+              <a:schemeClr val="tx1"/>
+            </a:gs>
+          </a:gsLst>
+          <a:lin ang="4200000" scaled="0"/>
+        </a:gradFill>
+        <a:effectLst/>
+      </p:bgPr>
+    </p:bg>
+    <p:spTree>
+      <p:nvGrpSpPr>
+        <p:cNvPr id="1" name=""/>
+        <p:cNvGrpSpPr/>
+        <p:nvPr/>
+      </p:nvGrpSpPr>
+      <p:grpSpPr>
+        <a:xfrm>
+          <a:off x="0" y="0"/>
+          <a:ext cx="0" cy="0"/>
+          <a:chOff x="0" y="0"/>
+          <a:chExt cx="0" cy="0"/>
+        </a:xfrm>
+      </p:grpSpPr>
+      <p:sp>
+        <p:nvSpPr>
+          <p:cNvPr id="6" name="Rectangle 5">
+            <a:extLst>
+              <a:ext uri="{FF2B5EF4-FFF2-40B4-BE49-F238E27FC236}">
+                <a16:creationId xmlns:a16="http://schemas.microsoft.com/office/drawing/2014/main" id="{B8D994DE-B884-0CDA-5E25-50BC911EFE57}"/>
+              </a:ext>
+            </a:extLst>
+          </p:cNvPr>
+          <p:cNvSpPr/>
+          <p:nvPr/>
+        </p:nvSpPr>
+        <p:spPr>
+          <a:xfrm>
+            <a:off x="3545632" y="1250302"/>
+            <a:ext cx="2550368" cy="2845837"/>
+          </a:xfrm>
+          <a:prstGeom prst="rect">
+            <a:avLst/>
+          </a:prstGeom>
+          <a:solidFill>
+            <a:schemeClr val="tx1">
+              <a:lumMod val="75000"/>
+              <a:lumOff val="25000"/>
+            </a:schemeClr>
+          </a:solidFill>
+          <a:ln w="19050">
+            <a:gradFill>
+              <a:gsLst>
+                <a:gs pos="0">
+                  <a:schemeClr val="bg1"/>
+                </a:gs>
+                <a:gs pos="42000">
+                  <a:schemeClr val="tx1">
+                    <a:lumMod val="75000"/>
+                    <a:lumOff val="25000"/>
+                  </a:schemeClr>
+                </a:gs>
+              </a:gsLst>
+              <a:lin ang="3000000" scaled="0"/>
+            </a:gradFill>
+          </a:ln>
+          <a:effectLst>
+            <a:outerShdw blurRad="304800" dist="50800" dir="2700000" algn="ctr" rotWithShape="0">
+              <a:srgbClr val="000000"/>
+            </a:outerShdw>
+          </a:effectLst>
+        </p:spPr>
+        <p:style>
+          <a:lnRef idx="2">
+            <a:schemeClr val="accent1">
+              <a:shade val="15000"/>
+            </a:schemeClr>
+          </a:lnRef>
+          <a:fillRef idx="1">
+            <a:schemeClr val="accent1"/>
+          </a:fillRef>
+          <a:effectRef idx="0">
+            <a:schemeClr val="accent1"/>
+          </a:effectRef>
+          <a:fontRef idx="minor">
+            <a:schemeClr val="lt1"/>
+          </a:fontRef>
+        </p:style>
+        <p:txBody>
+          <a:bodyPr rtlCol="0" anchor="ctr"/>
+          <a:lstStyle/>
+          <a:p>
+            <a:pPr algn="ctr"/>
+            <a:endParaRPr lang="fr-FR" dirty="0">
+              <a:solidFill>
+                <a:srgbClr val="FF0000"/>
+              </a:solidFill>
+            </a:endParaRPr>
+          </a:p>
+        </p:txBody>
+      </p:sp>
+      <p:sp>
+        <p:nvSpPr>
+          <p:cNvPr id="7" name="Rectangle 6">
+            <a:extLst>
+              <a:ext uri="{FF2B5EF4-FFF2-40B4-BE49-F238E27FC236}">
+                <a16:creationId xmlns:a16="http://schemas.microsoft.com/office/drawing/2014/main" id="{35BA1DCB-CF45-0071-E9D7-95095B508AC1}"/>
+              </a:ext>
+            </a:extLst>
+          </p:cNvPr>
+          <p:cNvSpPr/>
+          <p:nvPr/>
+        </p:nvSpPr>
+        <p:spPr>
+          <a:xfrm>
+            <a:off x="6310603" y="1250302"/>
+            <a:ext cx="2550368" cy="2845837"/>
+          </a:xfrm>
+          <a:prstGeom prst="rect">
+            <a:avLst/>
+          </a:prstGeom>
+          <a:solidFill>
+            <a:schemeClr val="tx1">
+              <a:lumMod val="75000"/>
+              <a:lumOff val="25000"/>
+            </a:schemeClr>
+          </a:solidFill>
+          <a:ln w="19050">
+            <a:gradFill>
+              <a:gsLst>
+                <a:gs pos="0">
+                  <a:schemeClr val="bg1"/>
+                </a:gs>
+                <a:gs pos="42000">
+                  <a:schemeClr val="tx1">
+                    <a:lumMod val="75000"/>
+                    <a:lumOff val="25000"/>
+                  </a:schemeClr>
+                </a:gs>
+              </a:gsLst>
+              <a:lin ang="3000000" scaled="0"/>
+            </a:gradFill>
+          </a:ln>
+          <a:effectLst>
+            <a:outerShdw blurRad="304800" dist="50800" dir="2700000" algn="ctr" rotWithShape="0">
+              <a:srgbClr val="000000"/>
+            </a:outerShdw>
+          </a:effectLst>
+        </p:spPr>
+        <p:style>
+          <a:lnRef idx="2">
+            <a:schemeClr val="accent1">
+              <a:shade val="15000"/>
+            </a:schemeClr>
+          </a:lnRef>
+          <a:fillRef idx="1">
+            <a:schemeClr val="accent1"/>
+          </a:fillRef>
+          <a:effectRef idx="0">
+            <a:schemeClr val="accent1"/>
+          </a:effectRef>
+          <a:fontRef idx="minor">
+            <a:schemeClr val="lt1"/>
+          </a:fontRef>
+        </p:style>
+        <p:txBody>
+          <a:bodyPr rtlCol="0" anchor="ctr"/>
+          <a:lstStyle/>
+          <a:p>
+            <a:pPr algn="ctr"/>
+            <a:endParaRPr lang="fr-FR" dirty="0">
+              <a:solidFill>
+                <a:srgbClr val="FF0000"/>
+              </a:solidFill>
+            </a:endParaRPr>
+          </a:p>
+        </p:txBody>
+      </p:sp>
+      <p:sp>
+        <p:nvSpPr>
+          <p:cNvPr id="8" name="Rectangle 7">
+            <a:extLst>
+              <a:ext uri="{FF2B5EF4-FFF2-40B4-BE49-F238E27FC236}">
+                <a16:creationId xmlns:a16="http://schemas.microsoft.com/office/drawing/2014/main" id="{928781A4-47C4-93DC-6CDA-F5F1281F8CA5}"/>
+              </a:ext>
+            </a:extLst>
+          </p:cNvPr>
+          <p:cNvSpPr/>
+          <p:nvPr/>
+        </p:nvSpPr>
+        <p:spPr>
+          <a:xfrm>
+            <a:off x="9140888" y="1250302"/>
+            <a:ext cx="2923593" cy="2845837"/>
+          </a:xfrm>
+          <a:prstGeom prst="rect">
+            <a:avLst/>
+          </a:prstGeom>
+          <a:solidFill>
+            <a:schemeClr val="tx1">
+              <a:lumMod val="75000"/>
+              <a:lumOff val="25000"/>
+            </a:schemeClr>
+          </a:solidFill>
+          <a:ln w="19050">
+            <a:gradFill>
+              <a:gsLst>
+                <a:gs pos="0">
+                  <a:schemeClr val="bg1"/>
+                </a:gs>
+                <a:gs pos="42000">
+                  <a:schemeClr val="tx1">
+                    <a:lumMod val="75000"/>
+                    <a:lumOff val="25000"/>
+                  </a:schemeClr>
+                </a:gs>
+              </a:gsLst>
+              <a:lin ang="3000000" scaled="0"/>
+            </a:gradFill>
+          </a:ln>
+          <a:effectLst>
+            <a:outerShdw blurRad="304800" dist="50800" dir="2700000" algn="ctr" rotWithShape="0">
+              <a:srgbClr val="000000"/>
+            </a:outerShdw>
+          </a:effectLst>
+        </p:spPr>
+        <p:style>
+          <a:lnRef idx="2">
+            <a:schemeClr val="accent1">
+              <a:shade val="15000"/>
+            </a:schemeClr>
+          </a:lnRef>
+          <a:fillRef idx="1">
+            <a:schemeClr val="accent1"/>
+          </a:fillRef>
+          <a:effectRef idx="0">
+            <a:schemeClr val="accent1"/>
+          </a:effectRef>
+          <a:fontRef idx="minor">
+            <a:schemeClr val="lt1"/>
+          </a:fontRef>
+        </p:style>
+        <p:txBody>
+          <a:bodyPr rtlCol="0" anchor="ctr"/>
+          <a:lstStyle/>
+          <a:p>
+            <a:pPr algn="ctr"/>
+            <a:endParaRPr lang="fr-FR" dirty="0">
+              <a:solidFill>
+                <a:srgbClr val="FF0000"/>
+              </a:solidFill>
+            </a:endParaRPr>
+          </a:p>
+        </p:txBody>
+      </p:sp>
+      <p:sp>
+        <p:nvSpPr>
+          <p:cNvPr id="9" name="Rectangle 8">
+            <a:extLst>
+              <a:ext uri="{FF2B5EF4-FFF2-40B4-BE49-F238E27FC236}">
+                <a16:creationId xmlns:a16="http://schemas.microsoft.com/office/drawing/2014/main" id="{4506DE2F-52C2-482A-2F79-B6130BB0472D}"/>
+              </a:ext>
+            </a:extLst>
+          </p:cNvPr>
+          <p:cNvSpPr/>
+          <p:nvPr/>
+        </p:nvSpPr>
+        <p:spPr>
+          <a:xfrm>
+            <a:off x="9140888" y="4254759"/>
+            <a:ext cx="2923593" cy="2514600"/>
+          </a:xfrm>
+          <a:prstGeom prst="rect">
+            <a:avLst/>
+          </a:prstGeom>
+          <a:solidFill>
+            <a:schemeClr val="tx1">
+              <a:lumMod val="75000"/>
+              <a:lumOff val="25000"/>
+            </a:schemeClr>
+          </a:solidFill>
+          <a:ln w="19050">
+            <a:gradFill>
+              <a:gsLst>
+                <a:gs pos="0">
+                  <a:schemeClr val="bg1"/>
+                </a:gs>
+                <a:gs pos="42000">
+                  <a:schemeClr val="tx1">
+                    <a:lumMod val="75000"/>
+                    <a:lumOff val="25000"/>
+                  </a:schemeClr>
+                </a:gs>
+              </a:gsLst>
+              <a:lin ang="3000000" scaled="0"/>
+            </a:gradFill>
+          </a:ln>
+          <a:effectLst>
+            <a:outerShdw blurRad="304800" dist="50800" dir="2700000" algn="ctr" rotWithShape="0">
+              <a:srgbClr val="000000"/>
+            </a:outerShdw>
+          </a:effectLst>
+        </p:spPr>
+        <p:style>
+          <a:lnRef idx="2">
+            <a:schemeClr val="accent1">
+              <a:shade val="15000"/>
+            </a:schemeClr>
+          </a:lnRef>
+          <a:fillRef idx="1">
+            <a:schemeClr val="accent1"/>
+          </a:fillRef>
+          <a:effectRef idx="0">
+            <a:schemeClr val="accent1"/>
+          </a:effectRef>
+          <a:fontRef idx="minor">
+            <a:schemeClr val="lt1"/>
+          </a:fontRef>
+        </p:style>
+        <p:txBody>
+          <a:bodyPr rtlCol="0" anchor="ctr"/>
+          <a:lstStyle/>
+          <a:p>
+            <a:pPr algn="ctr"/>
+            <a:endParaRPr lang="fr-FR" dirty="0">
+              <a:solidFill>
+                <a:srgbClr val="FF0000"/>
+              </a:solidFill>
+            </a:endParaRPr>
+          </a:p>
+        </p:txBody>
+      </p:sp>
+      <p:sp>
+        <p:nvSpPr>
+          <p:cNvPr id="10" name="Rectangle 9">
+            <a:extLst>
+              <a:ext uri="{FF2B5EF4-FFF2-40B4-BE49-F238E27FC236}">
+                <a16:creationId xmlns:a16="http://schemas.microsoft.com/office/drawing/2014/main" id="{A4556F34-3EDC-15B6-CFE9-369D1C897C66}"/>
+              </a:ext>
+            </a:extLst>
+          </p:cNvPr>
+          <p:cNvSpPr/>
+          <p:nvPr/>
+        </p:nvSpPr>
+        <p:spPr>
+          <a:xfrm>
+            <a:off x="4917231" y="4254759"/>
+            <a:ext cx="3943740" cy="2514600"/>
+          </a:xfrm>
+          <a:prstGeom prst="rect">
+            <a:avLst/>
+          </a:prstGeom>
+          <a:solidFill>
+            <a:schemeClr val="tx1">
+              <a:lumMod val="75000"/>
+              <a:lumOff val="25000"/>
+            </a:schemeClr>
+          </a:solidFill>
+          <a:ln w="19050">
+            <a:gradFill>
+              <a:gsLst>
+                <a:gs pos="0">
+                  <a:schemeClr val="bg1"/>
+                </a:gs>
+                <a:gs pos="42000">
+                  <a:schemeClr val="tx1">
+                    <a:lumMod val="75000"/>
+                    <a:lumOff val="25000"/>
+                  </a:schemeClr>
+                </a:gs>
+              </a:gsLst>
+              <a:lin ang="3000000" scaled="0"/>
+            </a:gradFill>
+          </a:ln>
+          <a:effectLst>
+            <a:outerShdw blurRad="304800" dist="50800" dir="2700000" algn="ctr" rotWithShape="0">
+              <a:srgbClr val="000000"/>
+            </a:outerShdw>
+          </a:effectLst>
+        </p:spPr>
+        <p:style>
+          <a:lnRef idx="2">
+            <a:schemeClr val="accent1">
+              <a:shade val="15000"/>
+            </a:schemeClr>
+          </a:lnRef>
+          <a:fillRef idx="1">
+            <a:schemeClr val="accent1"/>
+          </a:fillRef>
+          <a:effectRef idx="0">
+            <a:schemeClr val="accent1"/>
+          </a:effectRef>
+          <a:fontRef idx="minor">
+            <a:schemeClr val="lt1"/>
+          </a:fontRef>
+        </p:style>
+        <p:txBody>
+          <a:bodyPr rtlCol="0" anchor="ctr"/>
+          <a:lstStyle/>
+          <a:p>
+            <a:pPr algn="ctr"/>
+            <a:endParaRPr lang="fr-FR" dirty="0">
+              <a:solidFill>
+                <a:srgbClr val="FF0000"/>
+              </a:solidFill>
+            </a:endParaRPr>
+          </a:p>
+        </p:txBody>
+      </p:sp>
+      <p:sp>
+        <p:nvSpPr>
+          <p:cNvPr id="11" name="Rectangle 10">
+            <a:extLst>
+              <a:ext uri="{FF2B5EF4-FFF2-40B4-BE49-F238E27FC236}">
+                <a16:creationId xmlns:a16="http://schemas.microsoft.com/office/drawing/2014/main" id="{2E731B84-AF7C-B77B-8DBC-75B8B7DAA56B}"/>
+              </a:ext>
+            </a:extLst>
+          </p:cNvPr>
+          <p:cNvSpPr/>
+          <p:nvPr/>
+        </p:nvSpPr>
+        <p:spPr>
+          <a:xfrm>
+            <a:off x="1076129" y="4254759"/>
+            <a:ext cx="3486540" cy="2514600"/>
+          </a:xfrm>
+          <a:prstGeom prst="rect">
+            <a:avLst/>
+          </a:prstGeom>
+          <a:solidFill>
+            <a:schemeClr val="tx1">
+              <a:lumMod val="75000"/>
+              <a:lumOff val="25000"/>
+            </a:schemeClr>
+          </a:solidFill>
+          <a:ln w="19050">
+            <a:gradFill>
+              <a:gsLst>
+                <a:gs pos="0">
+                  <a:schemeClr val="bg1"/>
+                </a:gs>
+                <a:gs pos="42000">
+                  <a:schemeClr val="tx1">
+                    <a:lumMod val="75000"/>
+                    <a:lumOff val="25000"/>
+                  </a:schemeClr>
+                </a:gs>
+              </a:gsLst>
+              <a:lin ang="3000000" scaled="0"/>
+            </a:gradFill>
+          </a:ln>
+          <a:effectLst>
+            <a:outerShdw blurRad="304800" dist="50800" dir="2700000" algn="ctr" rotWithShape="0">
+              <a:srgbClr val="000000"/>
+            </a:outerShdw>
+          </a:effectLst>
+        </p:spPr>
+        <p:style>
+          <a:lnRef idx="2">
+            <a:schemeClr val="accent1">
+              <a:shade val="15000"/>
+            </a:schemeClr>
+          </a:lnRef>
+          <a:fillRef idx="1">
+            <a:schemeClr val="accent1"/>
+          </a:fillRef>
+          <a:effectRef idx="0">
+            <a:schemeClr val="accent1"/>
+          </a:effectRef>
+          <a:fontRef idx="minor">
+            <a:schemeClr val="lt1"/>
+          </a:fontRef>
+        </p:style>
+        <p:txBody>
+          <a:bodyPr rtlCol="0" anchor="ctr"/>
+          <a:lstStyle/>
+          <a:p>
+            <a:pPr algn="ctr"/>
+            <a:endParaRPr lang="fr-FR" dirty="0">
+              <a:solidFill>
+                <a:srgbClr val="FF0000"/>
+              </a:solidFill>
+            </a:endParaRPr>
+          </a:p>
+        </p:txBody>
+      </p:sp>
+      <p:sp>
+        <p:nvSpPr>
+          <p:cNvPr id="12" name="Rectangle 11">
+            <a:extLst>
+              <a:ext uri="{FF2B5EF4-FFF2-40B4-BE49-F238E27FC236}">
+                <a16:creationId xmlns:a16="http://schemas.microsoft.com/office/drawing/2014/main" id="{E1CFAAD7-0148-A09D-8F0C-678FAB515A18}"/>
+              </a:ext>
+            </a:extLst>
+          </p:cNvPr>
+          <p:cNvSpPr/>
+          <p:nvPr/>
+        </p:nvSpPr>
+        <p:spPr>
+          <a:xfrm>
+            <a:off x="3708193" y="174586"/>
+            <a:ext cx="2550368" cy="780661"/>
+          </a:xfrm>
+          <a:prstGeom prst="rect">
+            <a:avLst/>
+          </a:prstGeom>
+          <a:solidFill>
+            <a:schemeClr val="tx1">
+              <a:lumMod val="75000"/>
+              <a:lumOff val="25000"/>
+            </a:schemeClr>
+          </a:solidFill>
+          <a:ln w="19050">
+            <a:gradFill>
+              <a:gsLst>
+                <a:gs pos="0">
+                  <a:schemeClr val="bg1"/>
+                </a:gs>
+                <a:gs pos="42000">
+                  <a:schemeClr val="tx1">
+                    <a:lumMod val="75000"/>
+                    <a:lumOff val="25000"/>
+                  </a:schemeClr>
+                </a:gs>
+              </a:gsLst>
+              <a:lin ang="3000000" scaled="0"/>
+            </a:gradFill>
+          </a:ln>
+          <a:effectLst>
+            <a:outerShdw blurRad="304800" dist="50800" dir="2700000" algn="ctr" rotWithShape="0">
+              <a:srgbClr val="000000"/>
+            </a:outerShdw>
+          </a:effectLst>
+        </p:spPr>
+        <p:style>
+          <a:lnRef idx="2">
+            <a:schemeClr val="accent1">
+              <a:shade val="15000"/>
+            </a:schemeClr>
+          </a:lnRef>
+          <a:fillRef idx="1">
+            <a:schemeClr val="accent1"/>
+          </a:fillRef>
+          <a:effectRef idx="0">
+            <a:schemeClr val="accent1"/>
+          </a:effectRef>
+          <a:fontRef idx="minor">
+            <a:schemeClr val="lt1"/>
+          </a:fontRef>
+        </p:style>
+        <p:txBody>
+          <a:bodyPr rtlCol="0" anchor="ctr"/>
+          <a:lstStyle/>
+          <a:p>
+            <a:pPr algn="ctr"/>
+            <a:endParaRPr lang="fr-FR" dirty="0">
+              <a:solidFill>
+                <a:srgbClr val="FF0000"/>
+              </a:solidFill>
+            </a:endParaRPr>
+          </a:p>
+        </p:txBody>
+      </p:sp>
+      <p:sp>
+        <p:nvSpPr>
+          <p:cNvPr id="13" name="Rectangle 12">
+            <a:extLst>
+              <a:ext uri="{FF2B5EF4-FFF2-40B4-BE49-F238E27FC236}">
+                <a16:creationId xmlns:a16="http://schemas.microsoft.com/office/drawing/2014/main" id="{34008CB2-D119-09FE-0320-B2457E6828D9}"/>
+              </a:ext>
+            </a:extLst>
+          </p:cNvPr>
+          <p:cNvSpPr/>
+          <p:nvPr/>
+        </p:nvSpPr>
+        <p:spPr>
+          <a:xfrm>
+            <a:off x="6510485" y="189318"/>
+            <a:ext cx="2550368" cy="780661"/>
+          </a:xfrm>
+          <a:prstGeom prst="rect">
+            <a:avLst/>
+          </a:prstGeom>
+          <a:solidFill>
+            <a:schemeClr val="tx1">
+              <a:lumMod val="75000"/>
+              <a:lumOff val="25000"/>
+            </a:schemeClr>
+          </a:solidFill>
+          <a:ln w="19050">
+            <a:gradFill>
+              <a:gsLst>
+                <a:gs pos="0">
+                  <a:schemeClr val="bg1"/>
+                </a:gs>
+                <a:gs pos="42000">
+                  <a:schemeClr val="tx1">
+                    <a:lumMod val="75000"/>
+                    <a:lumOff val="25000"/>
+                  </a:schemeClr>
+                </a:gs>
+              </a:gsLst>
+              <a:lin ang="3000000" scaled="0"/>
+            </a:gradFill>
+          </a:ln>
+          <a:effectLst>
+            <a:outerShdw blurRad="304800" dist="50800" dir="2700000" algn="ctr" rotWithShape="0">
+              <a:srgbClr val="000000"/>
+            </a:outerShdw>
+          </a:effectLst>
+        </p:spPr>
+        <p:style>
+          <a:lnRef idx="2">
+            <a:schemeClr val="accent1">
+              <a:shade val="15000"/>
+            </a:schemeClr>
+          </a:lnRef>
+          <a:fillRef idx="1">
+            <a:schemeClr val="accent1"/>
+          </a:fillRef>
+          <a:effectRef idx="0">
+            <a:schemeClr val="accent1"/>
+          </a:effectRef>
+          <a:fontRef idx="minor">
+            <a:schemeClr val="lt1"/>
+          </a:fontRef>
+        </p:style>
+        <p:txBody>
+          <a:bodyPr rtlCol="0" anchor="ctr"/>
+          <a:lstStyle/>
+          <a:p>
+            <a:pPr algn="ctr"/>
+            <a:endParaRPr lang="fr-FR" dirty="0">
+              <a:solidFill>
+                <a:srgbClr val="FF0000"/>
+              </a:solidFill>
+            </a:endParaRPr>
+          </a:p>
+        </p:txBody>
+      </p:sp>
+      <p:sp>
+        <p:nvSpPr>
+          <p:cNvPr id="14" name="Rectangle 13">
+            <a:extLst>
+              <a:ext uri="{FF2B5EF4-FFF2-40B4-BE49-F238E27FC236}">
+                <a16:creationId xmlns:a16="http://schemas.microsoft.com/office/drawing/2014/main" id="{C9CE0FA2-FE83-1CBE-D959-C3C1DED70CA3}"/>
+              </a:ext>
+            </a:extLst>
+          </p:cNvPr>
+          <p:cNvSpPr/>
+          <p:nvPr/>
+        </p:nvSpPr>
+        <p:spPr>
+          <a:xfrm>
+            <a:off x="9312777" y="163700"/>
+            <a:ext cx="2550368" cy="780661"/>
+          </a:xfrm>
+          <a:prstGeom prst="rect">
+            <a:avLst/>
+          </a:prstGeom>
+          <a:solidFill>
+            <a:schemeClr val="tx1">
+              <a:lumMod val="75000"/>
+              <a:lumOff val="25000"/>
+            </a:schemeClr>
+          </a:solidFill>
+          <a:ln w="19050">
+            <a:gradFill>
+              <a:gsLst>
+                <a:gs pos="0">
+                  <a:schemeClr val="bg1"/>
+                </a:gs>
+                <a:gs pos="42000">
+                  <a:schemeClr val="tx1">
+                    <a:lumMod val="75000"/>
+                    <a:lumOff val="25000"/>
+                  </a:schemeClr>
+                </a:gs>
+              </a:gsLst>
+              <a:lin ang="3000000" scaled="0"/>
+            </a:gradFill>
+          </a:ln>
+          <a:effectLst>
+            <a:outerShdw blurRad="304800" dist="50800" dir="2700000" algn="ctr" rotWithShape="0">
+              <a:srgbClr val="000000"/>
+            </a:outerShdw>
+          </a:effectLst>
+        </p:spPr>
+        <p:style>
+          <a:lnRef idx="2">
+            <a:schemeClr val="accent1">
+              <a:shade val="15000"/>
+            </a:schemeClr>
+          </a:lnRef>
+          <a:fillRef idx="1">
+            <a:schemeClr val="accent1"/>
+          </a:fillRef>
+          <a:effectRef idx="0">
+            <a:schemeClr val="accent1"/>
+          </a:effectRef>
+          <a:fontRef idx="minor">
+            <a:schemeClr val="lt1"/>
+          </a:fontRef>
+        </p:style>
+        <p:txBody>
+          <a:bodyPr rtlCol="0" anchor="ctr"/>
+          <a:lstStyle/>
+          <a:p>
+            <a:pPr algn="ctr"/>
+            <a:endParaRPr lang="fr-FR" dirty="0">
+              <a:solidFill>
+                <a:srgbClr val="FF0000"/>
+              </a:solidFill>
+            </a:endParaRPr>
+          </a:p>
+        </p:txBody>
+      </p:sp>
+      <p:sp>
+        <p:nvSpPr>
+          <p:cNvPr id="15" name="Rectangle 14">
+            <a:extLst>
+              <a:ext uri="{FF2B5EF4-FFF2-40B4-BE49-F238E27FC236}">
+                <a16:creationId xmlns:a16="http://schemas.microsoft.com/office/drawing/2014/main" id="{96AB50F2-5959-7AAA-6773-45594DA64FE0}"/>
+              </a:ext>
+            </a:extLst>
+          </p:cNvPr>
+          <p:cNvSpPr/>
+          <p:nvPr/>
+        </p:nvSpPr>
+        <p:spPr>
+          <a:xfrm>
+            <a:off x="905901" y="163699"/>
+            <a:ext cx="2550368" cy="780661"/>
+          </a:xfrm>
+          <a:prstGeom prst="rect">
+            <a:avLst/>
+          </a:prstGeom>
+          <a:solidFill>
+            <a:schemeClr val="tx1">
+              <a:lumMod val="75000"/>
+              <a:lumOff val="25000"/>
+            </a:schemeClr>
+          </a:solidFill>
+          <a:ln w="19050">
+            <a:gradFill>
+              <a:gsLst>
+                <a:gs pos="0">
+                  <a:schemeClr val="bg1"/>
+                </a:gs>
+                <a:gs pos="42000">
+                  <a:schemeClr val="tx1">
+                    <a:lumMod val="75000"/>
+                    <a:lumOff val="25000"/>
+                  </a:schemeClr>
+                </a:gs>
+              </a:gsLst>
+              <a:lin ang="3000000" scaled="0"/>
+            </a:gradFill>
+          </a:ln>
+          <a:effectLst>
+            <a:outerShdw blurRad="304800" dist="50800" dir="2700000" algn="ctr" rotWithShape="0">
+              <a:srgbClr val="000000"/>
+            </a:outerShdw>
+          </a:effectLst>
+        </p:spPr>
+        <p:style>
+          <a:lnRef idx="2">
+            <a:schemeClr val="accent1">
+              <a:shade val="15000"/>
+            </a:schemeClr>
+          </a:lnRef>
+          <a:fillRef idx="1">
+            <a:schemeClr val="accent1"/>
+          </a:fillRef>
+          <a:effectRef idx="0">
+            <a:schemeClr val="accent1"/>
+          </a:effectRef>
+          <a:fontRef idx="minor">
+            <a:schemeClr val="lt1"/>
+          </a:fontRef>
+        </p:style>
+        <p:txBody>
+          <a:bodyPr rtlCol="0" anchor="ctr"/>
+          <a:lstStyle/>
+          <a:p>
+            <a:pPr algn="ctr"/>
+            <a:endParaRPr lang="fr-FR" dirty="0">
+              <a:solidFill>
+                <a:srgbClr val="FF0000"/>
+              </a:solidFill>
+            </a:endParaRPr>
+          </a:p>
+        </p:txBody>
+      </p:sp>
+      <p:sp>
+        <p:nvSpPr>
+          <p:cNvPr id="18" name="Flèche : pentagone 17">
+            <a:extLst>
+              <a:ext uri="{FF2B5EF4-FFF2-40B4-BE49-F238E27FC236}">
+                <a16:creationId xmlns:a16="http://schemas.microsoft.com/office/drawing/2014/main" id="{1AE030F5-3CA5-A8A1-9F6F-69FC9319025C}"/>
+              </a:ext>
+            </a:extLst>
+          </p:cNvPr>
+          <p:cNvSpPr/>
+          <p:nvPr/>
+        </p:nvSpPr>
+        <p:spPr>
+          <a:xfrm rot="5400000">
+            <a:off x="669862" y="2532872"/>
+            <a:ext cx="2128163" cy="998376"/>
+          </a:xfrm>
+          <a:prstGeom prst="homePlate">
+            <a:avLst/>
+          </a:prstGeom>
+          <a:solidFill>
+            <a:srgbClr val="007382"/>
+          </a:solidFill>
+        </p:spPr>
+        <p:style>
+          <a:lnRef idx="2">
+            <a:schemeClr val="accent1">
+              <a:shade val="15000"/>
+            </a:schemeClr>
+          </a:lnRef>
+          <a:fillRef idx="1">
+            <a:schemeClr val="accent1"/>
+          </a:fillRef>
+          <a:effectRef idx="0">
+            <a:schemeClr val="accent1"/>
+          </a:effectRef>
+          <a:fontRef idx="minor">
+            <a:schemeClr val="lt1"/>
+          </a:fontRef>
+        </p:style>
+        <p:txBody>
+          <a:bodyPr rtlCol="0" anchor="ctr"/>
+          <a:lstStyle/>
+          <a:p>
+            <a:pPr algn="ctr"/>
+            <a:endParaRPr lang="fr-FR"/>
+          </a:p>
+        </p:txBody>
+      </p:sp>
+      <p:sp>
+        <p:nvSpPr>
+          <p:cNvPr id="19" name="Flèche : pentagone 18">
+            <a:extLst>
+              <a:ext uri="{FF2B5EF4-FFF2-40B4-BE49-F238E27FC236}">
+                <a16:creationId xmlns:a16="http://schemas.microsoft.com/office/drawing/2014/main" id="{9885B719-2E30-2C5F-88AD-BDEF4F9DE42D}"/>
+              </a:ext>
+            </a:extLst>
+          </p:cNvPr>
+          <p:cNvSpPr/>
+          <p:nvPr/>
+        </p:nvSpPr>
+        <p:spPr>
+          <a:xfrm rot="5400000">
+            <a:off x="1865006" y="2532873"/>
+            <a:ext cx="2128162" cy="998376"/>
+          </a:xfrm>
+          <a:prstGeom prst="homePlate">
+            <a:avLst/>
+          </a:prstGeom>
+          <a:solidFill>
+            <a:srgbClr val="007382"/>
+          </a:solidFill>
+          <a:ln>
+            <a:noFill/>
+          </a:ln>
+        </p:spPr>
+        <p:style>
+          <a:lnRef idx="2">
+            <a:schemeClr val="accent1">
+              <a:shade val="15000"/>
+            </a:schemeClr>
+          </a:lnRef>
+          <a:fillRef idx="1">
+            <a:schemeClr val="accent1"/>
+          </a:fillRef>
+          <a:effectRef idx="0">
+            <a:schemeClr val="accent1"/>
+          </a:effectRef>
+          <a:fontRef idx="minor">
+            <a:schemeClr val="lt1"/>
+          </a:fontRef>
+        </p:style>
+        <p:txBody>
+          <a:bodyPr rtlCol="0" anchor="ctr"/>
+          <a:lstStyle/>
+          <a:p>
+            <a:pPr algn="ctr"/>
+            <a:endParaRPr lang="fr-FR"/>
+          </a:p>
+        </p:txBody>
+      </p:sp>
+      <p:sp>
+        <p:nvSpPr>
+          <p:cNvPr id="23" name="Double vague 22">
+            <a:extLst>
+              <a:ext uri="{FF2B5EF4-FFF2-40B4-BE49-F238E27FC236}">
+                <a16:creationId xmlns:a16="http://schemas.microsoft.com/office/drawing/2014/main" id="{F36A657D-ABF4-3DEA-D8D9-319A8546ADF5}"/>
+              </a:ext>
+            </a:extLst>
+          </p:cNvPr>
+          <p:cNvSpPr/>
+          <p:nvPr/>
+        </p:nvSpPr>
+        <p:spPr>
+          <a:xfrm>
+            <a:off x="1191206" y="1243457"/>
+            <a:ext cx="2140656" cy="559062"/>
+          </a:xfrm>
+          <a:prstGeom prst="doubleWave">
+            <a:avLst/>
+          </a:prstGeom>
+          <a:solidFill>
+            <a:srgbClr val="C3B9BE"/>
+          </a:solidFill>
+          <a:ln>
+            <a:solidFill>
+              <a:srgbClr val="C00000"/>
+            </a:solidFill>
+          </a:ln>
+        </p:spPr>
+        <p:style>
+          <a:lnRef idx="2">
+            <a:schemeClr val="accent1">
+              <a:shade val="15000"/>
+            </a:schemeClr>
+          </a:lnRef>
+          <a:fillRef idx="1">
+            <a:schemeClr val="accent1"/>
+          </a:fillRef>
+          <a:effectRef idx="0">
+            <a:schemeClr val="accent1"/>
+          </a:effectRef>
+          <a:fontRef idx="minor">
+            <a:schemeClr val="lt1"/>
+          </a:fontRef>
+        </p:style>
+        <p:txBody>
+          <a:bodyPr rtlCol="0" anchor="ctr"/>
+          <a:lstStyle/>
+          <a:p>
+            <a:pPr algn="ctr"/>
+            <a:r>
+              <a:rPr lang="fr-FR" dirty="0">
+                <a:solidFill>
+                  <a:schemeClr val="bg1"/>
+                </a:solidFill>
+                <a:highlight>
+                  <a:srgbClr val="007382"/>
+                </a:highlight>
+              </a:rPr>
+              <a:t>TOP</a:t>
+            </a:r>
+            <a:r>
+              <a:rPr lang="fr-FR" dirty="0">
+                <a:solidFill>
+                  <a:schemeClr val="tx1"/>
+                </a:solidFill>
+              </a:rPr>
+              <a:t> </a:t>
+            </a:r>
+            <a:r>
+              <a:rPr lang="fr-FR" dirty="0">
+                <a:solidFill>
+                  <a:srgbClr val="007382"/>
+                </a:solidFill>
+              </a:rPr>
+              <a:t>CITIES</a:t>
+            </a:r>
+          </a:p>
+        </p:txBody>
+      </p:sp>
+      <p:sp>
+        <p:nvSpPr>
+          <p:cNvPr id="25" name="Flèche : pentagone 24">
+            <a:extLst>
+              <a:ext uri="{FF2B5EF4-FFF2-40B4-BE49-F238E27FC236}">
+                <a16:creationId xmlns:a16="http://schemas.microsoft.com/office/drawing/2014/main" id="{CC8D094F-AEF6-0EF8-A6C7-E70BE86342FB}"/>
+              </a:ext>
+            </a:extLst>
+          </p:cNvPr>
+          <p:cNvSpPr/>
+          <p:nvPr/>
+        </p:nvSpPr>
+        <p:spPr>
+          <a:xfrm rot="5400000">
+            <a:off x="756122" y="2599018"/>
+            <a:ext cx="1948698" cy="839031"/>
+          </a:xfrm>
+          <a:prstGeom prst="homePlate">
+            <a:avLst/>
+          </a:prstGeom>
+          <a:solidFill>
+            <a:srgbClr val="007382"/>
+          </a:solidFill>
+          <a:ln w="28575">
+            <a:solidFill>
+              <a:srgbClr val="FEBB05"/>
+            </a:solidFill>
+            <a:prstDash val="sysDot"/>
+          </a:ln>
+        </p:spPr>
+        <p:style>
+          <a:lnRef idx="2">
+            <a:schemeClr val="accent1">
+              <a:shade val="15000"/>
+            </a:schemeClr>
+          </a:lnRef>
+          <a:fillRef idx="1">
+            <a:schemeClr val="accent1"/>
+          </a:fillRef>
+          <a:effectRef idx="0">
+            <a:schemeClr val="accent1"/>
+          </a:effectRef>
+          <a:fontRef idx="minor">
+            <a:schemeClr val="lt1"/>
+          </a:fontRef>
+        </p:style>
+        <p:txBody>
+          <a:bodyPr rtlCol="0" anchor="ctr"/>
+          <a:lstStyle/>
+          <a:p>
+            <a:pPr algn="ctr"/>
+            <a:endParaRPr lang="fr-FR" dirty="0"/>
+          </a:p>
+        </p:txBody>
+      </p:sp>
+      <p:sp>
+        <p:nvSpPr>
+          <p:cNvPr id="26" name="Flèche : pentagone 25">
+            <a:extLst>
+              <a:ext uri="{FF2B5EF4-FFF2-40B4-BE49-F238E27FC236}">
+                <a16:creationId xmlns:a16="http://schemas.microsoft.com/office/drawing/2014/main" id="{FDD975F3-1BF9-1070-134E-E6469170C115}"/>
+              </a:ext>
+            </a:extLst>
+          </p:cNvPr>
+          <p:cNvSpPr/>
+          <p:nvPr/>
+        </p:nvSpPr>
+        <p:spPr>
+          <a:xfrm rot="5400000">
+            <a:off x="1946128" y="2599018"/>
+            <a:ext cx="1948698" cy="839031"/>
+          </a:xfrm>
+          <a:prstGeom prst="homePlate">
+            <a:avLst/>
+          </a:prstGeom>
+          <a:solidFill>
+            <a:srgbClr val="007382"/>
+          </a:solidFill>
+          <a:ln w="28575">
+            <a:solidFill>
+              <a:srgbClr val="FEBB05"/>
+            </a:solidFill>
+            <a:prstDash val="sysDot"/>
+          </a:ln>
+        </p:spPr>
+        <p:style>
+          <a:lnRef idx="2">
+            <a:schemeClr val="accent1">
+              <a:shade val="15000"/>
+            </a:schemeClr>
+          </a:lnRef>
+          <a:fillRef idx="1">
+            <a:schemeClr val="accent1"/>
+          </a:fillRef>
+          <a:effectRef idx="0">
+            <a:schemeClr val="accent1"/>
+          </a:effectRef>
+          <a:fontRef idx="minor">
+            <a:schemeClr val="lt1"/>
+          </a:fontRef>
+        </p:style>
+        <p:txBody>
+          <a:bodyPr rtlCol="0" anchor="ctr"/>
+          <a:lstStyle/>
+          <a:p>
+            <a:pPr algn="ctr"/>
+            <a:endParaRPr lang="fr-FR"/>
+          </a:p>
+        </p:txBody>
+      </p:sp>
+      <p:pic>
+        <p:nvPicPr>
+          <p:cNvPr id="28" name="Graphique 27" descr="Trophée">
+            <a:extLst>
+              <a:ext uri="{FF2B5EF4-FFF2-40B4-BE49-F238E27FC236}">
+                <a16:creationId xmlns:a16="http://schemas.microsoft.com/office/drawing/2014/main" id="{0CFBEE49-A74E-98C6-1063-3DAD55320D1A}"/>
+              </a:ext>
+            </a:extLst>
+          </p:cNvPr>
+          <p:cNvPicPr>
+            <a:picLocks noChangeAspect="1"/>
+          </p:cNvPicPr>
+          <p:nvPr/>
+        </p:nvPicPr>
+        <p:blipFill>
+          <a:blip r:embed="rId2">
+            <a:extLst>
+              <a:ext uri="{96DAC541-7B7A-43D3-8B79-37D633B846F1}">
+                <asvg:svgBlip xmlns:asvg="http://schemas.microsoft.com/office/drawing/2016/SVG/main" r:embed="rId3"/>
+              </a:ext>
+            </a:extLst>
+          </a:blip>
+          <a:stretch>
+            <a:fillRect/>
+          </a:stretch>
+        </p:blipFill>
+        <p:spPr>
+          <a:xfrm>
+            <a:off x="1235689" y="1315170"/>
+            <a:ext cx="376753" cy="376753"/>
+          </a:xfrm>
+          <a:prstGeom prst="rect">
+            <a:avLst/>
+          </a:prstGeom>
+        </p:spPr>
+      </p:pic>
+      <p:pic>
+        <p:nvPicPr>
+          <p:cNvPr id="29" name="Graphique 28" descr="Trophée">
+            <a:extLst>
+              <a:ext uri="{FF2B5EF4-FFF2-40B4-BE49-F238E27FC236}">
+                <a16:creationId xmlns:a16="http://schemas.microsoft.com/office/drawing/2014/main" id="{76F6C4FC-7D65-272E-EC12-283854DED7CF}"/>
+              </a:ext>
+            </a:extLst>
+          </p:cNvPr>
+          <p:cNvPicPr>
+            <a:picLocks noChangeAspect="1"/>
+          </p:cNvPicPr>
+          <p:nvPr/>
+        </p:nvPicPr>
+        <p:blipFill>
+          <a:blip r:embed="rId2">
+            <a:extLst>
+              <a:ext uri="{96DAC541-7B7A-43D3-8B79-37D633B846F1}">
+                <asvg:svgBlip xmlns:asvg="http://schemas.microsoft.com/office/drawing/2016/SVG/main" r:embed="rId3"/>
+              </a:ext>
+            </a:extLst>
+          </a:blip>
+          <a:stretch>
+            <a:fillRect/>
+          </a:stretch>
+        </p:blipFill>
+        <p:spPr>
+          <a:xfrm>
+            <a:off x="2900477" y="1334611"/>
+            <a:ext cx="376753" cy="376753"/>
+          </a:xfrm>
+          <a:prstGeom prst="rect">
+            <a:avLst/>
+          </a:prstGeom>
+        </p:spPr>
+      </p:pic>
+      <p:sp>
+        <p:nvSpPr>
+          <p:cNvPr id="30" name="Triangle rectangle 29">
+            <a:extLst>
+              <a:ext uri="{FF2B5EF4-FFF2-40B4-BE49-F238E27FC236}">
+                <a16:creationId xmlns:a16="http://schemas.microsoft.com/office/drawing/2014/main" id="{75E824CB-6364-11D3-FEA3-3C30401F7935}"/>
+              </a:ext>
+            </a:extLst>
+          </p:cNvPr>
+          <p:cNvSpPr/>
+          <p:nvPr/>
+        </p:nvSpPr>
+        <p:spPr>
+          <a:xfrm rot="16200000">
+            <a:off x="1024964" y="2045404"/>
+            <a:ext cx="279914" cy="137134"/>
+          </a:xfrm>
+          <a:prstGeom prst="rtTriangle">
+            <a:avLst/>
+          </a:prstGeom>
+          <a:solidFill>
+            <a:srgbClr val="007382">
+              <a:alpha val="67000"/>
+            </a:srgbClr>
+          </a:solidFill>
+          <a:ln>
+            <a:noFill/>
+          </a:ln>
+        </p:spPr>
+        <p:style>
+          <a:lnRef idx="2">
+            <a:schemeClr val="accent1">
+              <a:shade val="15000"/>
+            </a:schemeClr>
+          </a:lnRef>
+          <a:fillRef idx="1">
+            <a:schemeClr val="accent1"/>
+          </a:fillRef>
+          <a:effectRef idx="0">
+            <a:schemeClr val="accent1"/>
+          </a:effectRef>
+          <a:fontRef idx="minor">
+            <a:schemeClr val="lt1"/>
+          </a:fontRef>
+        </p:style>
+        <p:txBody>
+          <a:bodyPr rtlCol="0" anchor="ctr"/>
+          <a:lstStyle/>
+          <a:p>
+            <a:pPr algn="ctr"/>
+            <a:endParaRPr lang="fr-FR"/>
+          </a:p>
+        </p:txBody>
+      </p:sp>
+      <p:sp>
+        <p:nvSpPr>
+          <p:cNvPr id="33" name="Triangle rectangle 32">
+            <a:extLst>
+              <a:ext uri="{FF2B5EF4-FFF2-40B4-BE49-F238E27FC236}">
+                <a16:creationId xmlns:a16="http://schemas.microsoft.com/office/drawing/2014/main" id="{CF41632B-2D0E-91E1-1735-C831FB0117B2}"/>
+              </a:ext>
+            </a:extLst>
+          </p:cNvPr>
+          <p:cNvSpPr/>
+          <p:nvPr/>
+        </p:nvSpPr>
+        <p:spPr>
+          <a:xfrm rot="16200000">
+            <a:off x="2225359" y="2035013"/>
+            <a:ext cx="279914" cy="137134"/>
+          </a:xfrm>
+          <a:prstGeom prst="rtTriangle">
+            <a:avLst/>
+          </a:prstGeom>
+          <a:solidFill>
+            <a:srgbClr val="007382">
+              <a:alpha val="67000"/>
+            </a:srgbClr>
+          </a:solidFill>
+          <a:ln>
+            <a:noFill/>
+          </a:ln>
+        </p:spPr>
+        <p:style>
+          <a:lnRef idx="2">
+            <a:schemeClr val="accent1">
+              <a:shade val="15000"/>
+            </a:schemeClr>
+          </a:lnRef>
+          <a:fillRef idx="1">
+            <a:schemeClr val="accent1"/>
+          </a:fillRef>
+          <a:effectRef idx="0">
+            <a:schemeClr val="accent1"/>
+          </a:effectRef>
+          <a:fontRef idx="minor">
+            <a:schemeClr val="lt1"/>
+          </a:fontRef>
+        </p:style>
+        <p:txBody>
+          <a:bodyPr rtlCol="0" anchor="ctr"/>
+          <a:lstStyle/>
+          <a:p>
+            <a:pPr algn="ctr"/>
+            <a:endParaRPr lang="fr-FR"/>
+          </a:p>
+        </p:txBody>
+      </p:sp>
+      <p:sp>
+        <p:nvSpPr>
+          <p:cNvPr id="34" name="ZoneTexte 33">
+            <a:extLst>
+              <a:ext uri="{FF2B5EF4-FFF2-40B4-BE49-F238E27FC236}">
+                <a16:creationId xmlns:a16="http://schemas.microsoft.com/office/drawing/2014/main" id="{FD020833-A292-C8DF-58F2-807043D8C716}"/>
+              </a:ext>
+            </a:extLst>
+          </p:cNvPr>
+          <p:cNvSpPr txBox="1"/>
+          <p:nvPr/>
+        </p:nvSpPr>
+        <p:spPr>
+          <a:xfrm>
+            <a:off x="1267812" y="2044184"/>
+            <a:ext cx="925318" cy="892552"/>
+          </a:xfrm>
+          <a:prstGeom prst="rect">
+            <a:avLst/>
+          </a:prstGeom>
+          <a:noFill/>
+        </p:spPr>
+        <p:txBody>
+          <a:bodyPr wrap="square" rtlCol="0">
+            <a:spAutoFit/>
+          </a:bodyPr>
+          <a:lstStyle/>
+          <a:p>
+            <a:pPr algn="ctr"/>
+            <a:r>
+              <a:rPr lang="fr-FR" sz="1300" b="1" dirty="0">
+                <a:solidFill>
+                  <a:srgbClr val="FEBB05"/>
+                </a:solidFill>
+              </a:rPr>
+              <a:t>TOP</a:t>
+            </a:r>
+          </a:p>
+          <a:p>
+            <a:pPr algn="ctr"/>
+            <a:endParaRPr lang="fr-FR" sz="1300" b="1" dirty="0">
+              <a:solidFill>
+                <a:srgbClr val="FEBB05"/>
+              </a:solidFill>
+            </a:endParaRPr>
+          </a:p>
+          <a:p>
+            <a:pPr algn="ctr"/>
+            <a:r>
+              <a:rPr lang="fr-FR" sz="1300" b="1" dirty="0">
+                <a:solidFill>
+                  <a:srgbClr val="FEBB05"/>
+                </a:solidFill>
+              </a:rPr>
+              <a:t> </a:t>
+            </a:r>
+          </a:p>
+          <a:p>
+            <a:pPr algn="ctr"/>
+            <a:r>
+              <a:rPr lang="fr-FR" sz="1300" b="1" dirty="0">
+                <a:solidFill>
+                  <a:srgbClr val="FEBB05"/>
+                </a:solidFill>
+              </a:rPr>
+              <a:t>PROFIT</a:t>
+            </a:r>
+          </a:p>
+        </p:txBody>
+      </p:sp>
+      <p:sp>
+        <p:nvSpPr>
+          <p:cNvPr id="35" name="ZoneTexte 34">
+            <a:extLst>
+              <a:ext uri="{FF2B5EF4-FFF2-40B4-BE49-F238E27FC236}">
+                <a16:creationId xmlns:a16="http://schemas.microsoft.com/office/drawing/2014/main" id="{505CE634-6CB4-CA10-9FC1-D20A8E80C7D5}"/>
+              </a:ext>
+            </a:extLst>
+          </p:cNvPr>
+          <p:cNvSpPr txBox="1"/>
+          <p:nvPr/>
+        </p:nvSpPr>
+        <p:spPr>
+          <a:xfrm>
+            <a:off x="2457818" y="2044184"/>
+            <a:ext cx="925318" cy="892552"/>
+          </a:xfrm>
+          <a:prstGeom prst="rect">
+            <a:avLst/>
+          </a:prstGeom>
+          <a:noFill/>
+        </p:spPr>
+        <p:txBody>
+          <a:bodyPr wrap="square" rtlCol="0">
+            <a:spAutoFit/>
+          </a:bodyPr>
+          <a:lstStyle/>
+          <a:p>
+            <a:pPr algn="ctr"/>
+            <a:r>
+              <a:rPr lang="fr-FR" sz="1300" b="1" dirty="0">
+                <a:solidFill>
+                  <a:srgbClr val="FEBB05"/>
+                </a:solidFill>
+              </a:rPr>
+              <a:t>TOP</a:t>
+            </a:r>
+          </a:p>
+          <a:p>
+            <a:pPr algn="ctr"/>
+            <a:endParaRPr lang="fr-FR" sz="1300" b="1">
+              <a:solidFill>
+                <a:srgbClr val="FEBB05"/>
+              </a:solidFill>
+            </a:endParaRPr>
+          </a:p>
+          <a:p>
+            <a:pPr algn="ctr"/>
+            <a:endParaRPr lang="fr-FR" sz="1300" b="1" dirty="0">
+              <a:solidFill>
+                <a:srgbClr val="FEBB05"/>
+              </a:solidFill>
+            </a:endParaRPr>
+          </a:p>
+          <a:p>
+            <a:pPr algn="ctr"/>
+            <a:r>
+              <a:rPr lang="fr-FR" sz="1300" b="1" dirty="0">
+                <a:solidFill>
+                  <a:srgbClr val="FEBB05"/>
+                </a:solidFill>
+              </a:rPr>
+              <a:t> ORDERS</a:t>
+            </a:r>
+          </a:p>
+        </p:txBody>
+      </p:sp>
+      <p:pic>
+        <p:nvPicPr>
+          <p:cNvPr id="37" name="Graphique 36" descr="Médaille">
+            <a:extLst>
+              <a:ext uri="{FF2B5EF4-FFF2-40B4-BE49-F238E27FC236}">
+                <a16:creationId xmlns:a16="http://schemas.microsoft.com/office/drawing/2014/main" id="{FA6CC1CD-997F-90B2-670F-F66B3FA3B513}"/>
+              </a:ext>
+            </a:extLst>
+          </p:cNvPr>
+          <p:cNvPicPr>
+            <a:picLocks noChangeAspect="1"/>
+          </p:cNvPicPr>
+          <p:nvPr/>
+        </p:nvPicPr>
+        <p:blipFill>
+          <a:blip r:embed="rId4">
+            <a:extLst>
+              <a:ext uri="{96DAC541-7B7A-43D3-8B79-37D633B846F1}">
+                <asvg:svgBlip xmlns:asvg="http://schemas.microsoft.com/office/drawing/2016/SVG/main" r:embed="rId5"/>
+              </a:ext>
+            </a:extLst>
+          </a:blip>
+          <a:stretch>
+            <a:fillRect/>
+          </a:stretch>
+        </p:blipFill>
+        <p:spPr>
+          <a:xfrm>
+            <a:off x="1519599" y="3481855"/>
+            <a:ext cx="397178" cy="397178"/>
+          </a:xfrm>
+          <a:prstGeom prst="rect">
+            <a:avLst/>
+          </a:prstGeom>
+        </p:spPr>
+      </p:pic>
+      <p:pic>
+        <p:nvPicPr>
+          <p:cNvPr id="38" name="Graphique 37" descr="Médaille">
+            <a:extLst>
+              <a:ext uri="{FF2B5EF4-FFF2-40B4-BE49-F238E27FC236}">
+                <a16:creationId xmlns:a16="http://schemas.microsoft.com/office/drawing/2014/main" id="{2CCF3241-BFF8-D70F-9793-C78417F376E2}"/>
+              </a:ext>
+            </a:extLst>
+          </p:cNvPr>
+          <p:cNvPicPr>
+            <a:picLocks noChangeAspect="1"/>
+          </p:cNvPicPr>
+          <p:nvPr/>
+        </p:nvPicPr>
+        <p:blipFill>
+          <a:blip r:embed="rId4">
+            <a:extLst>
+              <a:ext uri="{96DAC541-7B7A-43D3-8B79-37D633B846F1}">
+                <asvg:svgBlip xmlns:asvg="http://schemas.microsoft.com/office/drawing/2016/SVG/main" r:embed="rId5"/>
+              </a:ext>
+            </a:extLst>
+          </a:blip>
+          <a:stretch>
+            <a:fillRect/>
+          </a:stretch>
+        </p:blipFill>
+        <p:spPr>
+          <a:xfrm>
+            <a:off x="2730498" y="3481855"/>
+            <a:ext cx="397178" cy="397178"/>
+          </a:xfrm>
+          <a:prstGeom prst="rect">
+            <a:avLst/>
+          </a:prstGeom>
+        </p:spPr>
+      </p:pic>
+      <p:sp>
+        <p:nvSpPr>
+          <p:cNvPr id="41" name="Ellipse 40">
+            <a:extLst>
+              <a:ext uri="{FF2B5EF4-FFF2-40B4-BE49-F238E27FC236}">
+                <a16:creationId xmlns:a16="http://schemas.microsoft.com/office/drawing/2014/main" id="{B6EF0D8A-B134-D398-F670-30F9F357445C}"/>
+              </a:ext>
+            </a:extLst>
+          </p:cNvPr>
+          <p:cNvSpPr/>
+          <p:nvPr/>
+        </p:nvSpPr>
+        <p:spPr>
+          <a:xfrm>
+            <a:off x="969258" y="4135123"/>
+            <a:ext cx="279913" cy="279913"/>
+          </a:xfrm>
+          <a:prstGeom prst="ellipse">
+            <a:avLst/>
+          </a:prstGeom>
+          <a:ln>
+            <a:noFill/>
+          </a:ln>
+        </p:spPr>
+        <p:style>
+          <a:lnRef idx="2">
+            <a:schemeClr val="accent6"/>
+          </a:lnRef>
+          <a:fillRef idx="1">
+            <a:schemeClr val="lt1"/>
+          </a:fillRef>
+          <a:effectRef idx="0">
+            <a:schemeClr val="accent6"/>
+          </a:effectRef>
+          <a:fontRef idx="minor">
+            <a:schemeClr val="dk1"/>
+          </a:fontRef>
+        </p:style>
+        <p:txBody>
+          <a:bodyPr rtlCol="0" anchor="ctr"/>
+          <a:lstStyle/>
+          <a:p>
+            <a:pPr algn="ctr"/>
+            <a:endParaRPr lang="fr-FR"/>
+          </a:p>
+        </p:txBody>
+      </p:sp>
+      <p:sp>
+        <p:nvSpPr>
+          <p:cNvPr id="42" name="Ellipse 41">
+            <a:extLst>
+              <a:ext uri="{FF2B5EF4-FFF2-40B4-BE49-F238E27FC236}">
+                <a16:creationId xmlns:a16="http://schemas.microsoft.com/office/drawing/2014/main" id="{C2063E80-9EC8-C1CF-A7C1-3C63B0413E60}"/>
+              </a:ext>
+            </a:extLst>
+          </p:cNvPr>
+          <p:cNvSpPr/>
+          <p:nvPr/>
+        </p:nvSpPr>
+        <p:spPr>
+          <a:xfrm>
+            <a:off x="4759446" y="4114802"/>
+            <a:ext cx="279913" cy="279913"/>
+          </a:xfrm>
+          <a:prstGeom prst="ellipse">
+            <a:avLst/>
+          </a:prstGeom>
+          <a:ln>
+            <a:noFill/>
+          </a:ln>
+        </p:spPr>
+        <p:style>
+          <a:lnRef idx="2">
+            <a:schemeClr val="accent6"/>
+          </a:lnRef>
+          <a:fillRef idx="1">
+            <a:schemeClr val="lt1"/>
+          </a:fillRef>
+          <a:effectRef idx="0">
+            <a:schemeClr val="accent6"/>
+          </a:effectRef>
+          <a:fontRef idx="minor">
+            <a:schemeClr val="dk1"/>
+          </a:fontRef>
+        </p:style>
+        <p:txBody>
+          <a:bodyPr rtlCol="0" anchor="ctr"/>
+          <a:lstStyle/>
+          <a:p>
+            <a:pPr algn="ctr"/>
+            <a:endParaRPr lang="fr-FR"/>
+          </a:p>
+        </p:txBody>
+      </p:sp>
+      <p:pic>
+        <p:nvPicPr>
+          <p:cNvPr id="44" name="Graphique 43" descr="Tendance à la baisse">
+            <a:extLst>
+              <a:ext uri="{FF2B5EF4-FFF2-40B4-BE49-F238E27FC236}">
+                <a16:creationId xmlns:a16="http://schemas.microsoft.com/office/drawing/2014/main" id="{CEB99785-18A7-94E4-0040-F926805FA3B7}"/>
+              </a:ext>
+            </a:extLst>
+          </p:cNvPr>
+          <p:cNvPicPr>
+            <a:picLocks noChangeAspect="1"/>
+          </p:cNvPicPr>
+          <p:nvPr/>
+        </p:nvPicPr>
+        <p:blipFill>
+          <a:blip r:embed="rId6">
+            <a:extLst>
+              <a:ext uri="{96DAC541-7B7A-43D3-8B79-37D633B846F1}">
+                <asvg:svgBlip xmlns:asvg="http://schemas.microsoft.com/office/drawing/2016/SVG/main" r:embed="rId7"/>
+              </a:ext>
+            </a:extLst>
+          </a:blip>
+          <a:stretch>
+            <a:fillRect/>
+          </a:stretch>
+        </p:blipFill>
+        <p:spPr>
+          <a:xfrm>
+            <a:off x="4758041" y="4114802"/>
+            <a:ext cx="259080" cy="259080"/>
+          </a:xfrm>
+          <a:prstGeom prst="rect">
+            <a:avLst/>
+          </a:prstGeom>
+        </p:spPr>
+      </p:pic>
+      <p:sp>
+        <p:nvSpPr>
+          <p:cNvPr id="45" name="Ellipse 44">
+            <a:extLst>
+              <a:ext uri="{FF2B5EF4-FFF2-40B4-BE49-F238E27FC236}">
+                <a16:creationId xmlns:a16="http://schemas.microsoft.com/office/drawing/2014/main" id="{AF8872D5-FA3A-15CE-DF95-C97BB4CB3FE0}"/>
+              </a:ext>
+            </a:extLst>
+          </p:cNvPr>
+          <p:cNvSpPr/>
+          <p:nvPr/>
+        </p:nvSpPr>
+        <p:spPr>
+          <a:xfrm>
+            <a:off x="9018756" y="4124731"/>
+            <a:ext cx="279913" cy="279913"/>
+          </a:xfrm>
+          <a:prstGeom prst="ellipse">
+            <a:avLst/>
+          </a:prstGeom>
+          <a:ln>
+            <a:noFill/>
+          </a:ln>
+        </p:spPr>
+        <p:style>
+          <a:lnRef idx="2">
+            <a:schemeClr val="accent6"/>
+          </a:lnRef>
+          <a:fillRef idx="1">
+            <a:schemeClr val="lt1"/>
+          </a:fillRef>
+          <a:effectRef idx="0">
+            <a:schemeClr val="accent6"/>
+          </a:effectRef>
+          <a:fontRef idx="minor">
+            <a:schemeClr val="dk1"/>
+          </a:fontRef>
+        </p:style>
+        <p:txBody>
+          <a:bodyPr rtlCol="0" anchor="ctr"/>
+          <a:lstStyle/>
+          <a:p>
+            <a:pPr algn="ctr"/>
+            <a:endParaRPr lang="fr-FR"/>
+          </a:p>
+        </p:txBody>
+      </p:sp>
+      <p:pic>
+        <p:nvPicPr>
+          <p:cNvPr id="47" name="Graphique 46" descr="Marqueur">
+            <a:extLst>
+              <a:ext uri="{FF2B5EF4-FFF2-40B4-BE49-F238E27FC236}">
+                <a16:creationId xmlns:a16="http://schemas.microsoft.com/office/drawing/2014/main" id="{150742B0-F0BA-1492-4EB4-E7DD161540A4}"/>
+              </a:ext>
+            </a:extLst>
+          </p:cNvPr>
+          <p:cNvPicPr>
+            <a:picLocks noChangeAspect="1"/>
+          </p:cNvPicPr>
+          <p:nvPr/>
+        </p:nvPicPr>
+        <p:blipFill>
+          <a:blip r:embed="rId8">
+            <a:extLst>
+              <a:ext uri="{96DAC541-7B7A-43D3-8B79-37D633B846F1}">
+                <asvg:svgBlip xmlns:asvg="http://schemas.microsoft.com/office/drawing/2016/SVG/main" r:embed="rId9"/>
+              </a:ext>
+            </a:extLst>
+          </a:blip>
+          <a:stretch>
+            <a:fillRect/>
+          </a:stretch>
+        </p:blipFill>
+        <p:spPr>
+          <a:xfrm>
+            <a:off x="9024099" y="4130298"/>
+            <a:ext cx="289560" cy="289560"/>
+          </a:xfrm>
+          <a:prstGeom prst="rect">
+            <a:avLst/>
+          </a:prstGeom>
+        </p:spPr>
+      </p:pic>
+      <p:sp>
+        <p:nvSpPr>
+          <p:cNvPr id="48" name="ZoneTexte 47">
+            <a:extLst>
+              <a:ext uri="{FF2B5EF4-FFF2-40B4-BE49-F238E27FC236}">
+                <a16:creationId xmlns:a16="http://schemas.microsoft.com/office/drawing/2014/main" id="{B053ED89-EB12-5EC8-2C0F-A91DD58F6828}"/>
+              </a:ext>
+            </a:extLst>
+          </p:cNvPr>
+          <p:cNvSpPr txBox="1"/>
+          <p:nvPr/>
+        </p:nvSpPr>
+        <p:spPr>
+          <a:xfrm>
+            <a:off x="1079825" y="174586"/>
+            <a:ext cx="1223631" cy="292388"/>
+          </a:xfrm>
+          <a:prstGeom prst="rect">
+            <a:avLst/>
+          </a:prstGeom>
+          <a:noFill/>
+        </p:spPr>
+        <p:txBody>
+          <a:bodyPr wrap="square" rtlCol="0">
+            <a:spAutoFit/>
+          </a:bodyPr>
+          <a:lstStyle/>
+          <a:p>
+            <a:pPr algn="ctr"/>
+            <a:r>
+              <a:rPr lang="fr-FR" sz="1300" b="1" dirty="0">
+                <a:solidFill>
+                  <a:schemeClr val="bg1"/>
+                </a:solidFill>
+              </a:rPr>
+              <a:t>SELECT STATE</a:t>
+            </a:r>
+          </a:p>
+        </p:txBody>
+      </p:sp>
+      <p:sp>
+        <p:nvSpPr>
+          <p:cNvPr id="49" name="ZoneTexte 48">
+            <a:extLst>
+              <a:ext uri="{FF2B5EF4-FFF2-40B4-BE49-F238E27FC236}">
+                <a16:creationId xmlns:a16="http://schemas.microsoft.com/office/drawing/2014/main" id="{40FD7FFF-EF9F-7D3C-E178-2767F3493F48}"/>
+              </a:ext>
+            </a:extLst>
+          </p:cNvPr>
+          <p:cNvSpPr txBox="1"/>
+          <p:nvPr/>
+        </p:nvSpPr>
+        <p:spPr>
+          <a:xfrm>
+            <a:off x="3708192" y="174586"/>
+            <a:ext cx="1223631" cy="292388"/>
+          </a:xfrm>
+          <a:prstGeom prst="rect">
+            <a:avLst/>
+          </a:prstGeom>
+          <a:noFill/>
+        </p:spPr>
+        <p:txBody>
+          <a:bodyPr wrap="square" rtlCol="0">
+            <a:spAutoFit/>
+          </a:bodyPr>
+          <a:lstStyle/>
+          <a:p>
+            <a:pPr algn="ctr"/>
+            <a:r>
+              <a:rPr lang="fr-FR" sz="1300" b="1" dirty="0">
+                <a:solidFill>
+                  <a:srgbClr val="FEBB05"/>
+                </a:solidFill>
+              </a:rPr>
+              <a:t>TOTAL PROFIT</a:t>
+            </a:r>
+          </a:p>
+        </p:txBody>
+      </p:sp>
+      <p:sp>
+        <p:nvSpPr>
+          <p:cNvPr id="50" name="ZoneTexte 49">
+            <a:extLst>
+              <a:ext uri="{FF2B5EF4-FFF2-40B4-BE49-F238E27FC236}">
+                <a16:creationId xmlns:a16="http://schemas.microsoft.com/office/drawing/2014/main" id="{9BEE671A-0A67-92AA-A14F-99C68DBAB8D3}"/>
+              </a:ext>
+            </a:extLst>
+          </p:cNvPr>
+          <p:cNvSpPr txBox="1"/>
+          <p:nvPr/>
+        </p:nvSpPr>
+        <p:spPr>
+          <a:xfrm>
+            <a:off x="6524716" y="174586"/>
+            <a:ext cx="1461323" cy="292388"/>
+          </a:xfrm>
+          <a:prstGeom prst="rect">
+            <a:avLst/>
+          </a:prstGeom>
+          <a:noFill/>
+        </p:spPr>
+        <p:txBody>
+          <a:bodyPr wrap="square" rtlCol="0">
+            <a:spAutoFit/>
+          </a:bodyPr>
+          <a:lstStyle/>
+          <a:p>
+            <a:pPr algn="ctr"/>
+            <a:r>
+              <a:rPr lang="fr-FR" sz="1300" b="1" dirty="0">
+                <a:solidFill>
+                  <a:srgbClr val="FEBB05"/>
+                </a:solidFill>
+              </a:rPr>
+              <a:t>NUMBER ORDERS</a:t>
+            </a:r>
+          </a:p>
+        </p:txBody>
+      </p:sp>
+      <p:sp>
+        <p:nvSpPr>
+          <p:cNvPr id="51" name="ZoneTexte 50">
+            <a:extLst>
+              <a:ext uri="{FF2B5EF4-FFF2-40B4-BE49-F238E27FC236}">
+                <a16:creationId xmlns:a16="http://schemas.microsoft.com/office/drawing/2014/main" id="{6831E863-27D7-B22B-F558-D7B93E2F50B3}"/>
+              </a:ext>
+            </a:extLst>
+          </p:cNvPr>
+          <p:cNvSpPr txBox="1"/>
+          <p:nvPr/>
+        </p:nvSpPr>
+        <p:spPr>
+          <a:xfrm>
+            <a:off x="9312777" y="158877"/>
+            <a:ext cx="755783" cy="292388"/>
+          </a:xfrm>
+          <a:prstGeom prst="rect">
+            <a:avLst/>
+          </a:prstGeom>
+          <a:noFill/>
+        </p:spPr>
+        <p:txBody>
+          <a:bodyPr wrap="square" rtlCol="0">
+            <a:spAutoFit/>
+          </a:bodyPr>
+          <a:lstStyle/>
+          <a:p>
+            <a:pPr algn="ctr"/>
+            <a:r>
+              <a:rPr lang="fr-FR" sz="1300" b="1" dirty="0">
+                <a:solidFill>
+                  <a:srgbClr val="FEBB05"/>
+                </a:solidFill>
+              </a:rPr>
+              <a:t>MARGE</a:t>
+            </a:r>
+          </a:p>
+        </p:txBody>
+      </p:sp>
+      <p:pic>
+        <p:nvPicPr>
+          <p:cNvPr id="53" name="Graphique 52" descr="Argent">
+            <a:extLst>
+              <a:ext uri="{FF2B5EF4-FFF2-40B4-BE49-F238E27FC236}">
+                <a16:creationId xmlns:a16="http://schemas.microsoft.com/office/drawing/2014/main" id="{6697FBF6-AB43-3E1E-3A49-61957D594C83}"/>
+              </a:ext>
+            </a:extLst>
+          </p:cNvPr>
+          <p:cNvPicPr>
+            <a:picLocks noChangeAspect="1"/>
+          </p:cNvPicPr>
+          <p:nvPr/>
+        </p:nvPicPr>
+        <p:blipFill>
+          <a:blip r:embed="rId10">
+            <a:extLst>
+              <a:ext uri="{96DAC541-7B7A-43D3-8B79-37D633B846F1}">
+                <asvg:svgBlip xmlns:asvg="http://schemas.microsoft.com/office/drawing/2016/SVG/main" r:embed="rId11"/>
+              </a:ext>
+            </a:extLst>
+          </a:blip>
+          <a:stretch>
+            <a:fillRect/>
+          </a:stretch>
+        </p:blipFill>
+        <p:spPr>
+          <a:xfrm>
+            <a:off x="5548745" y="312540"/>
+            <a:ext cx="604194" cy="481345"/>
+          </a:xfrm>
+          <a:prstGeom prst="rect">
+            <a:avLst/>
+          </a:prstGeom>
+        </p:spPr>
+      </p:pic>
+      <p:pic>
+        <p:nvPicPr>
+          <p:cNvPr id="55" name="Graphique 54" descr="Panier">
+            <a:extLst>
+              <a:ext uri="{FF2B5EF4-FFF2-40B4-BE49-F238E27FC236}">
+                <a16:creationId xmlns:a16="http://schemas.microsoft.com/office/drawing/2014/main" id="{B3AD0395-39BC-4FEB-E4FC-644CB9A5E83D}"/>
+              </a:ext>
+            </a:extLst>
+          </p:cNvPr>
+          <p:cNvPicPr>
+            <a:picLocks noChangeAspect="1"/>
+          </p:cNvPicPr>
+          <p:nvPr/>
+        </p:nvPicPr>
+        <p:blipFill>
+          <a:blip r:embed="rId12">
+            <a:extLst>
+              <a:ext uri="{96DAC541-7B7A-43D3-8B79-37D633B846F1}">
+                <asvg:svgBlip xmlns:asvg="http://schemas.microsoft.com/office/drawing/2016/SVG/main" r:embed="rId13"/>
+              </a:ext>
+            </a:extLst>
+          </a:blip>
+          <a:stretch>
+            <a:fillRect/>
+          </a:stretch>
+        </p:blipFill>
+        <p:spPr>
+          <a:xfrm>
+            <a:off x="8495505" y="343713"/>
+            <a:ext cx="481345" cy="481345"/>
+          </a:xfrm>
+          <a:prstGeom prst="rect">
+            <a:avLst/>
+          </a:prstGeom>
+        </p:spPr>
+      </p:pic>
+      <p:pic>
+        <p:nvPicPr>
+          <p:cNvPr id="57" name="Graphique 56" descr="Tirelire">
+            <a:extLst>
+              <a:ext uri="{FF2B5EF4-FFF2-40B4-BE49-F238E27FC236}">
+                <a16:creationId xmlns:a16="http://schemas.microsoft.com/office/drawing/2014/main" id="{91D0A83C-E9F5-369C-5017-2A60A9B9B6EF}"/>
+              </a:ext>
+            </a:extLst>
+          </p:cNvPr>
+          <p:cNvPicPr>
+            <a:picLocks noChangeAspect="1"/>
+          </p:cNvPicPr>
+          <p:nvPr/>
+        </p:nvPicPr>
+        <p:blipFill>
+          <a:blip r:embed="rId14">
+            <a:extLst>
+              <a:ext uri="{96DAC541-7B7A-43D3-8B79-37D633B846F1}">
+                <asvg:svgBlip xmlns:asvg="http://schemas.microsoft.com/office/drawing/2016/SVG/main" r:embed="rId15"/>
+              </a:ext>
+            </a:extLst>
+          </a:blip>
+          <a:stretch>
+            <a:fillRect/>
+          </a:stretch>
+        </p:blipFill>
+        <p:spPr>
+          <a:xfrm>
+            <a:off x="11279814" y="321004"/>
+            <a:ext cx="495625" cy="495625"/>
+          </a:xfrm>
+          <a:prstGeom prst="rect">
+            <a:avLst/>
+          </a:prstGeom>
+        </p:spPr>
+      </p:pic>
+      <p:sp>
+        <p:nvSpPr>
+          <p:cNvPr id="58" name="Ellipse 57">
+            <a:extLst>
+              <a:ext uri="{FF2B5EF4-FFF2-40B4-BE49-F238E27FC236}">
+                <a16:creationId xmlns:a16="http://schemas.microsoft.com/office/drawing/2014/main" id="{F826854C-B787-FB33-DFB0-3E1783545D71}"/>
+              </a:ext>
+            </a:extLst>
+          </p:cNvPr>
+          <p:cNvSpPr/>
+          <p:nvPr/>
+        </p:nvSpPr>
+        <p:spPr>
+          <a:xfrm>
+            <a:off x="3403623" y="1091682"/>
+            <a:ext cx="279913" cy="279913"/>
+          </a:xfrm>
+          <a:prstGeom prst="ellipse">
+            <a:avLst/>
+          </a:prstGeom>
+          <a:ln>
+            <a:noFill/>
+          </a:ln>
+        </p:spPr>
+        <p:style>
+          <a:lnRef idx="2">
+            <a:schemeClr val="accent6"/>
+          </a:lnRef>
+          <a:fillRef idx="1">
+            <a:schemeClr val="lt1"/>
+          </a:fillRef>
+          <a:effectRef idx="0">
+            <a:schemeClr val="accent6"/>
+          </a:effectRef>
+          <a:fontRef idx="minor">
+            <a:schemeClr val="dk1"/>
+          </a:fontRef>
+        </p:style>
+        <p:txBody>
+          <a:bodyPr rtlCol="0" anchor="ctr"/>
+          <a:lstStyle/>
+          <a:p>
+            <a:pPr algn="ctr"/>
+            <a:endParaRPr lang="fr-FR"/>
+          </a:p>
+        </p:txBody>
+      </p:sp>
+      <p:sp>
+        <p:nvSpPr>
+          <p:cNvPr id="59" name="Ellipse 58">
+            <a:extLst>
+              <a:ext uri="{FF2B5EF4-FFF2-40B4-BE49-F238E27FC236}">
+                <a16:creationId xmlns:a16="http://schemas.microsoft.com/office/drawing/2014/main" id="{A2D20545-202C-CA2E-18C1-C59AEED39020}"/>
+              </a:ext>
+            </a:extLst>
+          </p:cNvPr>
+          <p:cNvSpPr/>
+          <p:nvPr/>
+        </p:nvSpPr>
+        <p:spPr>
+          <a:xfrm>
+            <a:off x="6170646" y="1091681"/>
+            <a:ext cx="279913" cy="279913"/>
+          </a:xfrm>
+          <a:prstGeom prst="ellipse">
+            <a:avLst/>
+          </a:prstGeom>
+          <a:ln>
+            <a:noFill/>
+          </a:ln>
+        </p:spPr>
+        <p:style>
+          <a:lnRef idx="2">
+            <a:schemeClr val="accent6"/>
+          </a:lnRef>
+          <a:fillRef idx="1">
+            <a:schemeClr val="lt1"/>
+          </a:fillRef>
+          <a:effectRef idx="0">
+            <a:schemeClr val="accent6"/>
+          </a:effectRef>
+          <a:fontRef idx="minor">
+            <a:schemeClr val="dk1"/>
+          </a:fontRef>
+        </p:style>
+        <p:txBody>
+          <a:bodyPr rtlCol="0" anchor="ctr"/>
+          <a:lstStyle/>
+          <a:p>
+            <a:pPr algn="ctr"/>
+            <a:endParaRPr lang="fr-FR"/>
+          </a:p>
+        </p:txBody>
+      </p:sp>
+      <p:sp>
+        <p:nvSpPr>
+          <p:cNvPr id="60" name="Ellipse 59">
+            <a:extLst>
+              <a:ext uri="{FF2B5EF4-FFF2-40B4-BE49-F238E27FC236}">
+                <a16:creationId xmlns:a16="http://schemas.microsoft.com/office/drawing/2014/main" id="{013816B1-4CD6-8AF1-BC43-C310116F0DA5}"/>
+              </a:ext>
+            </a:extLst>
+          </p:cNvPr>
+          <p:cNvSpPr/>
+          <p:nvPr/>
+        </p:nvSpPr>
+        <p:spPr>
+          <a:xfrm>
+            <a:off x="9025244" y="1107934"/>
+            <a:ext cx="279913" cy="279913"/>
+          </a:xfrm>
+          <a:prstGeom prst="ellipse">
+            <a:avLst/>
+          </a:prstGeom>
+          <a:ln>
+            <a:noFill/>
+          </a:ln>
+        </p:spPr>
+        <p:style>
+          <a:lnRef idx="2">
+            <a:schemeClr val="accent6"/>
+          </a:lnRef>
+          <a:fillRef idx="1">
+            <a:schemeClr val="lt1"/>
+          </a:fillRef>
+          <a:effectRef idx="0">
+            <a:schemeClr val="accent6"/>
+          </a:effectRef>
+          <a:fontRef idx="minor">
+            <a:schemeClr val="dk1"/>
+          </a:fontRef>
+        </p:style>
+        <p:txBody>
+          <a:bodyPr rtlCol="0" anchor="ctr"/>
+          <a:lstStyle/>
+          <a:p>
+            <a:pPr algn="ctr"/>
+            <a:endParaRPr lang="fr-FR"/>
+          </a:p>
+        </p:txBody>
+      </p:sp>
+      <p:pic>
+        <p:nvPicPr>
+          <p:cNvPr id="61" name="Graphique 60" descr="Médaille">
+            <a:extLst>
+              <a:ext uri="{FF2B5EF4-FFF2-40B4-BE49-F238E27FC236}">
+                <a16:creationId xmlns:a16="http://schemas.microsoft.com/office/drawing/2014/main" id="{87479F3F-518C-CE10-8D01-04171E659655}"/>
+              </a:ext>
+            </a:extLst>
+          </p:cNvPr>
+          <p:cNvPicPr>
+            <a:picLocks noChangeAspect="1"/>
+          </p:cNvPicPr>
+          <p:nvPr/>
+        </p:nvPicPr>
+        <p:blipFill>
+          <a:blip r:embed="rId16">
+            <a:extLst>
+              <a:ext uri="{96DAC541-7B7A-43D3-8B79-37D633B846F1}">
+                <asvg:svgBlip xmlns:asvg="http://schemas.microsoft.com/office/drawing/2016/SVG/main" r:embed="rId17"/>
+              </a:ext>
+            </a:extLst>
+          </a:blip>
+          <a:stretch>
+            <a:fillRect/>
+          </a:stretch>
+        </p:blipFill>
+        <p:spPr>
+          <a:xfrm>
+            <a:off x="3393296" y="1101841"/>
+            <a:ext cx="292388" cy="292388"/>
+          </a:xfrm>
+          <a:prstGeom prst="rect">
+            <a:avLst/>
+          </a:prstGeom>
+        </p:spPr>
+      </p:pic>
+      <p:pic>
+        <p:nvPicPr>
+          <p:cNvPr id="62" name="Graphique 61" descr="Médaille">
+            <a:extLst>
+              <a:ext uri="{FF2B5EF4-FFF2-40B4-BE49-F238E27FC236}">
+                <a16:creationId xmlns:a16="http://schemas.microsoft.com/office/drawing/2014/main" id="{127415C2-C5D6-D953-F761-2E1ECBEA2738}"/>
+              </a:ext>
+            </a:extLst>
+          </p:cNvPr>
+          <p:cNvPicPr>
+            <a:picLocks noChangeAspect="1"/>
+          </p:cNvPicPr>
+          <p:nvPr/>
+        </p:nvPicPr>
+        <p:blipFill>
+          <a:blip r:embed="rId16">
+            <a:extLst>
+              <a:ext uri="{96DAC541-7B7A-43D3-8B79-37D633B846F1}">
+                <asvg:svgBlip xmlns:asvg="http://schemas.microsoft.com/office/drawing/2016/SVG/main" r:embed="rId17"/>
+              </a:ext>
+            </a:extLst>
+          </a:blip>
+          <a:stretch>
+            <a:fillRect/>
+          </a:stretch>
+        </p:blipFill>
+        <p:spPr>
+          <a:xfrm>
+            <a:off x="6163330" y="1101841"/>
+            <a:ext cx="292388" cy="292388"/>
+          </a:xfrm>
+          <a:prstGeom prst="rect">
+            <a:avLst/>
+          </a:prstGeom>
+        </p:spPr>
+      </p:pic>
+      <p:pic>
+        <p:nvPicPr>
+          <p:cNvPr id="64" name="Graphique 63" descr="Cible">
+            <a:extLst>
+              <a:ext uri="{FF2B5EF4-FFF2-40B4-BE49-F238E27FC236}">
+                <a16:creationId xmlns:a16="http://schemas.microsoft.com/office/drawing/2014/main" id="{C756FE8F-CA6B-6823-FF52-9BBBC9BB3DDB}"/>
+              </a:ext>
+            </a:extLst>
+          </p:cNvPr>
+          <p:cNvPicPr>
+            <a:picLocks noChangeAspect="1"/>
+          </p:cNvPicPr>
+          <p:nvPr/>
+        </p:nvPicPr>
+        <p:blipFill>
+          <a:blip r:embed="rId18">
+            <a:extLst>
+              <a:ext uri="{96DAC541-7B7A-43D3-8B79-37D633B846F1}">
+                <asvg:svgBlip xmlns:asvg="http://schemas.microsoft.com/office/drawing/2016/SVG/main" r:embed="rId19"/>
+              </a:ext>
+            </a:extLst>
+          </a:blip>
+          <a:stretch>
+            <a:fillRect/>
+          </a:stretch>
+        </p:blipFill>
+        <p:spPr>
+          <a:xfrm>
+            <a:off x="9021248" y="1112001"/>
+            <a:ext cx="289560" cy="289560"/>
+          </a:xfrm>
+          <a:prstGeom prst="rect">
+            <a:avLst/>
+          </a:prstGeom>
+        </p:spPr>
+      </p:pic>
+      <p:sp>
+        <p:nvSpPr>
+          <p:cNvPr id="65" name="ZoneTexte 64">
+            <a:extLst>
+              <a:ext uri="{FF2B5EF4-FFF2-40B4-BE49-F238E27FC236}">
+                <a16:creationId xmlns:a16="http://schemas.microsoft.com/office/drawing/2014/main" id="{C2315C00-9F60-6808-7ECA-0B40AD78423E}"/>
+              </a:ext>
+            </a:extLst>
+          </p:cNvPr>
+          <p:cNvSpPr txBox="1"/>
+          <p:nvPr/>
+        </p:nvSpPr>
+        <p:spPr>
+          <a:xfrm>
+            <a:off x="3627062" y="1250067"/>
+            <a:ext cx="2365600" cy="261610"/>
+          </a:xfrm>
+          <a:prstGeom prst="rect">
+            <a:avLst/>
+          </a:prstGeom>
+          <a:noFill/>
+        </p:spPr>
+        <p:txBody>
+          <a:bodyPr wrap="square" rtlCol="0">
+            <a:spAutoFit/>
+          </a:bodyPr>
+          <a:lstStyle/>
+          <a:p>
+            <a:pPr algn="ctr"/>
+            <a:r>
+              <a:rPr lang="fr-FR" sz="1100" b="1" dirty="0">
+                <a:solidFill>
+                  <a:schemeClr val="bg1"/>
+                </a:solidFill>
+              </a:rPr>
+              <a:t>TOP CUSTOMER BY PROFIT</a:t>
+            </a:r>
+          </a:p>
+        </p:txBody>
+      </p:sp>
+      <p:sp>
+        <p:nvSpPr>
+          <p:cNvPr id="66" name="ZoneTexte 65">
+            <a:extLst>
+              <a:ext uri="{FF2B5EF4-FFF2-40B4-BE49-F238E27FC236}">
+                <a16:creationId xmlns:a16="http://schemas.microsoft.com/office/drawing/2014/main" id="{6C572419-6A37-DCC6-AA88-2A09AB4D90D7}"/>
+              </a:ext>
+            </a:extLst>
+          </p:cNvPr>
+          <p:cNvSpPr txBox="1"/>
+          <p:nvPr/>
+        </p:nvSpPr>
+        <p:spPr>
+          <a:xfrm>
+            <a:off x="6365756" y="1239676"/>
+            <a:ext cx="2365600" cy="261610"/>
+          </a:xfrm>
+          <a:prstGeom prst="rect">
+            <a:avLst/>
+          </a:prstGeom>
+          <a:noFill/>
+        </p:spPr>
+        <p:txBody>
+          <a:bodyPr wrap="square" rtlCol="0">
+            <a:spAutoFit/>
+          </a:bodyPr>
+          <a:lstStyle/>
+          <a:p>
+            <a:pPr algn="ctr"/>
+            <a:r>
+              <a:rPr lang="fr-FR" sz="1100" b="1" dirty="0">
+                <a:solidFill>
+                  <a:schemeClr val="bg1"/>
+                </a:solidFill>
+              </a:rPr>
+              <a:t>TOP CUSTOMER BY MARGE</a:t>
+            </a:r>
+          </a:p>
+        </p:txBody>
+      </p:sp>
+      <p:sp>
+        <p:nvSpPr>
+          <p:cNvPr id="67" name="ZoneTexte 66">
+            <a:extLst>
+              <a:ext uri="{FF2B5EF4-FFF2-40B4-BE49-F238E27FC236}">
+                <a16:creationId xmlns:a16="http://schemas.microsoft.com/office/drawing/2014/main" id="{4E707C21-B388-387C-E68D-A8C184F4AB12}"/>
+              </a:ext>
+            </a:extLst>
+          </p:cNvPr>
+          <p:cNvSpPr txBox="1"/>
+          <p:nvPr/>
+        </p:nvSpPr>
+        <p:spPr>
+          <a:xfrm>
+            <a:off x="9140888" y="1239676"/>
+            <a:ext cx="2923592" cy="261610"/>
+          </a:xfrm>
+          <a:prstGeom prst="rect">
+            <a:avLst/>
+          </a:prstGeom>
+          <a:noFill/>
+        </p:spPr>
+        <p:txBody>
+          <a:bodyPr wrap="square" rtlCol="0">
+            <a:spAutoFit/>
+          </a:bodyPr>
+          <a:lstStyle/>
+          <a:p>
+            <a:pPr algn="ctr"/>
+            <a:r>
+              <a:rPr lang="fr-FR" sz="1100" b="1" dirty="0">
+                <a:solidFill>
+                  <a:schemeClr val="bg1"/>
+                </a:solidFill>
+              </a:rPr>
+              <a:t>STATE PERFORMANCE MATRIX</a:t>
+            </a:r>
+          </a:p>
+        </p:txBody>
+      </p:sp>
+      <p:sp>
+        <p:nvSpPr>
+          <p:cNvPr id="68" name="ZoneTexte 67">
+            <a:extLst>
+              <a:ext uri="{FF2B5EF4-FFF2-40B4-BE49-F238E27FC236}">
+                <a16:creationId xmlns:a16="http://schemas.microsoft.com/office/drawing/2014/main" id="{BB22BF5C-FFFA-F22C-129A-C109E63392A3}"/>
+              </a:ext>
+            </a:extLst>
+          </p:cNvPr>
+          <p:cNvSpPr txBox="1"/>
+          <p:nvPr/>
+        </p:nvSpPr>
+        <p:spPr>
+          <a:xfrm>
+            <a:off x="1636599" y="4255688"/>
+            <a:ext cx="2365600" cy="261610"/>
+          </a:xfrm>
+          <a:prstGeom prst="rect">
+            <a:avLst/>
+          </a:prstGeom>
+          <a:noFill/>
+        </p:spPr>
+        <p:txBody>
+          <a:bodyPr wrap="square" rtlCol="0">
+            <a:spAutoFit/>
+          </a:bodyPr>
+          <a:lstStyle/>
+          <a:p>
+            <a:pPr algn="ctr"/>
+            <a:r>
+              <a:rPr lang="fr-FR" sz="1100" b="1" dirty="0">
+                <a:solidFill>
+                  <a:schemeClr val="bg1"/>
+                </a:solidFill>
+              </a:rPr>
+              <a:t>PROFIT DISTRIBUTION BY STATE</a:t>
+            </a:r>
+          </a:p>
+        </p:txBody>
+      </p:sp>
+      <p:sp>
+        <p:nvSpPr>
+          <p:cNvPr id="69" name="ZoneTexte 68">
+            <a:extLst>
+              <a:ext uri="{FF2B5EF4-FFF2-40B4-BE49-F238E27FC236}">
+                <a16:creationId xmlns:a16="http://schemas.microsoft.com/office/drawing/2014/main" id="{28E49021-C156-56A8-4425-63CDAE119B4A}"/>
+              </a:ext>
+            </a:extLst>
+          </p:cNvPr>
+          <p:cNvSpPr txBox="1"/>
+          <p:nvPr/>
+        </p:nvSpPr>
+        <p:spPr>
+          <a:xfrm>
+            <a:off x="5706300" y="4248072"/>
+            <a:ext cx="2544081" cy="261610"/>
+          </a:xfrm>
+          <a:prstGeom prst="rect">
+            <a:avLst/>
+          </a:prstGeom>
+          <a:noFill/>
+        </p:spPr>
+        <p:txBody>
+          <a:bodyPr wrap="square" rtlCol="0">
+            <a:spAutoFit/>
+          </a:bodyPr>
+          <a:lstStyle/>
+          <a:p>
+            <a:pPr algn="ctr"/>
+            <a:r>
+              <a:rPr lang="fr-FR" sz="1100" b="1" dirty="0">
+                <a:solidFill>
+                  <a:schemeClr val="bg1"/>
+                </a:solidFill>
+              </a:rPr>
+              <a:t>PROFITABILITY PER PURCHASE VOLUME</a:t>
+            </a:r>
+          </a:p>
+        </p:txBody>
+      </p:sp>
+      <p:sp>
+        <p:nvSpPr>
+          <p:cNvPr id="70" name="ZoneTexte 69">
+            <a:extLst>
+              <a:ext uri="{FF2B5EF4-FFF2-40B4-BE49-F238E27FC236}">
+                <a16:creationId xmlns:a16="http://schemas.microsoft.com/office/drawing/2014/main" id="{CF4243D5-1D48-A317-0754-1717AC7285D3}"/>
+              </a:ext>
+            </a:extLst>
+          </p:cNvPr>
+          <p:cNvSpPr txBox="1"/>
+          <p:nvPr/>
+        </p:nvSpPr>
+        <p:spPr>
+          <a:xfrm>
+            <a:off x="9495103" y="4258207"/>
+            <a:ext cx="2365600" cy="261610"/>
+          </a:xfrm>
+          <a:prstGeom prst="rect">
+            <a:avLst/>
+          </a:prstGeom>
+          <a:noFill/>
+        </p:spPr>
+        <p:txBody>
+          <a:bodyPr wrap="square" rtlCol="0">
+            <a:spAutoFit/>
+          </a:bodyPr>
+          <a:lstStyle/>
+          <a:p>
+            <a:pPr algn="ctr"/>
+            <a:r>
+              <a:rPr lang="fr-FR" sz="1100" b="1" dirty="0">
+                <a:solidFill>
+                  <a:schemeClr val="bg1"/>
+                </a:solidFill>
+              </a:rPr>
+              <a:t>SALES REVENUE PER LOCATION</a:t>
+            </a:r>
+          </a:p>
+        </p:txBody>
+      </p:sp>
+      <p:sp>
+        <p:nvSpPr>
+          <p:cNvPr id="71" name="Rectangle : avec coins arrondis en diagonale 70">
+            <a:extLst>
+              <a:ext uri="{FF2B5EF4-FFF2-40B4-BE49-F238E27FC236}">
+                <a16:creationId xmlns:a16="http://schemas.microsoft.com/office/drawing/2014/main" id="{572902BB-121C-4323-0BA6-E3D49217B495}"/>
+              </a:ext>
+            </a:extLst>
+          </p:cNvPr>
+          <p:cNvSpPr/>
+          <p:nvPr/>
+        </p:nvSpPr>
+        <p:spPr>
+          <a:xfrm>
+            <a:off x="79458" y="1401561"/>
+            <a:ext cx="834024" cy="4864157"/>
+          </a:xfrm>
+          <a:prstGeom prst="round2DiagRect">
+            <a:avLst>
+              <a:gd name="adj1" fmla="val 50000"/>
+              <a:gd name="adj2" fmla="val 0"/>
+            </a:avLst>
+          </a:prstGeom>
+          <a:solidFill>
+            <a:srgbClr val="FFCCFF">
+              <a:alpha val="45000"/>
+            </a:srgbClr>
+          </a:solidFill>
+          <a:ln>
+            <a:noFill/>
+          </a:ln>
+        </p:spPr>
+        <p:style>
+          <a:lnRef idx="1">
+            <a:schemeClr val="dk1"/>
+          </a:lnRef>
+          <a:fillRef idx="2">
+            <a:schemeClr val="dk1"/>
+          </a:fillRef>
+          <a:effectRef idx="1">
+            <a:schemeClr val="dk1"/>
+          </a:effectRef>
+          <a:fontRef idx="minor">
+            <a:schemeClr val="dk1"/>
+          </a:fontRef>
+        </p:style>
+        <p:txBody>
+          <a:bodyPr rtlCol="0" anchor="ctr"/>
+          <a:lstStyle/>
+          <a:p>
+            <a:pPr algn="ctr"/>
+            <a:endParaRPr lang="fr-FR" dirty="0"/>
+          </a:p>
+        </p:txBody>
+      </p:sp>
+      <p:pic>
+        <p:nvPicPr>
+          <p:cNvPr id="75" name="Graphique 74" descr="Ruban">
+            <a:extLst>
+              <a:ext uri="{FF2B5EF4-FFF2-40B4-BE49-F238E27FC236}">
+                <a16:creationId xmlns:a16="http://schemas.microsoft.com/office/drawing/2014/main" id="{3E36DFAE-207A-B5D4-671A-0F9C3EB75FA8}"/>
+              </a:ext>
+            </a:extLst>
+          </p:cNvPr>
+          <p:cNvPicPr>
+            <a:picLocks noChangeAspect="1"/>
+          </p:cNvPicPr>
+          <p:nvPr/>
+        </p:nvPicPr>
+        <p:blipFill>
+          <a:blip r:embed="rId20">
+            <a:extLst>
+              <a:ext uri="{96DAC541-7B7A-43D3-8B79-37D633B846F1}">
+                <asvg:svgBlip xmlns:asvg="http://schemas.microsoft.com/office/drawing/2016/SVG/main" r:embed="rId21"/>
+              </a:ext>
+            </a:extLst>
+          </a:blip>
+          <a:stretch>
+            <a:fillRect/>
+          </a:stretch>
+        </p:blipFill>
+        <p:spPr>
+          <a:xfrm>
+            <a:off x="963705" y="4138448"/>
+            <a:ext cx="286979" cy="286979"/>
+          </a:xfrm>
+          <a:prstGeom prst="rect">
+            <a:avLst/>
+          </a:prstGeom>
+        </p:spPr>
+      </p:pic>
+      <p:sp>
+        <p:nvSpPr>
+          <p:cNvPr id="76" name="ZoneTexte 75">
+            <a:extLst>
+              <a:ext uri="{FF2B5EF4-FFF2-40B4-BE49-F238E27FC236}">
+                <a16:creationId xmlns:a16="http://schemas.microsoft.com/office/drawing/2014/main" id="{BF19E069-0C86-3DC3-B503-1C47D77AA9B3}"/>
+              </a:ext>
+            </a:extLst>
+          </p:cNvPr>
+          <p:cNvSpPr txBox="1"/>
+          <p:nvPr/>
+        </p:nvSpPr>
+        <p:spPr>
+          <a:xfrm rot="16200000">
+            <a:off x="-1912666" y="3456285"/>
+            <a:ext cx="4737062" cy="707886"/>
+          </a:xfrm>
+          <a:prstGeom prst="rect">
+            <a:avLst/>
+          </a:prstGeom>
+          <a:noFill/>
+        </p:spPr>
+        <p:txBody>
+          <a:bodyPr wrap="square" rtlCol="0">
+            <a:spAutoFit/>
+          </a:bodyPr>
+          <a:lstStyle/>
+          <a:p>
+            <a:r>
+              <a:rPr lang="en-GB" sz="2000" dirty="0">
+                <a:solidFill>
+                  <a:schemeClr val="bg1"/>
+                </a:solidFill>
+              </a:rPr>
+              <a:t>Customer &amp; Regional Performance Analysis</a:t>
+            </a:r>
+            <a:br>
+              <a:rPr lang="en-GB" sz="2000" dirty="0">
+                <a:solidFill>
+                  <a:schemeClr val="bg1"/>
+                </a:solidFill>
+              </a:rPr>
+            </a:br>
+            <a:r>
+              <a:rPr lang="en-GB" sz="2000" dirty="0">
+                <a:solidFill>
+                  <a:schemeClr val="bg1"/>
+                </a:solidFill>
+              </a:rPr>
+              <a:t>2018 - 2019</a:t>
+            </a:r>
+            <a:endParaRPr lang="fr-FR" sz="2000" dirty="0">
+              <a:solidFill>
+                <a:schemeClr val="bg1"/>
+              </a:solidFill>
+            </a:endParaRPr>
+          </a:p>
+        </p:txBody>
+      </p:sp>
+    </p:spTree>
+    <p:extLst>
+      <p:ext uri="{BB962C8B-B14F-4D97-AF65-F5344CB8AC3E}">
+        <p14:creationId xmlns:p14="http://schemas.microsoft.com/office/powerpoint/2010/main" val="3117503239"/>
+      </p:ext>
+    </p:extLst>
+  </p:cSld>
+  <p:clrMapOvr>
+    <a:masterClrMapping/>
+  </p:clrMapOvr>
+</p:sld>
+</file>
+
 <file path=ppt/theme/theme1.xml><?xml version="1.0" encoding="utf-8"?>
 <a:theme xmlns:a="http://schemas.openxmlformats.org/drawingml/2006/main" name="Thème Office">
   <a:themeElements>

</xml_diff>

<commit_message>
2nd commit architecture product and category insight
</commit_message>
<xml_diff>
--- a/DataBase/style/style.pptx
+++ b/DataBase/style/style.pptx
@@ -7,6 +7,7 @@
   <p:sldIdLst>
     <p:sldId id="256" r:id="rId2"/>
     <p:sldId id="257" r:id="rId3"/>
+    <p:sldId id="258" r:id="rId4"/>
   </p:sldIdLst>
   <p:sldSz cx="12192000" cy="6858000"/>
   <p:notesSz cx="6858000" cy="9144000"/>
@@ -260,7 +261,7 @@
           <a:p>
             <a:fld id="{06639CF7-1097-4C3B-8127-169A3EEBE66B}" type="datetimeFigureOut">
               <a:rPr lang="fr-FR" smtClean="0"/>
-              <a:t>01/10/2025</a:t>
+              <a:t>07/10/2025</a:t>
             </a:fld>
             <a:endParaRPr lang="fr-FR"/>
           </a:p>
@@ -458,7 +459,7 @@
           <a:p>
             <a:fld id="{06639CF7-1097-4C3B-8127-169A3EEBE66B}" type="datetimeFigureOut">
               <a:rPr lang="fr-FR" smtClean="0"/>
-              <a:t>01/10/2025</a:t>
+              <a:t>07/10/2025</a:t>
             </a:fld>
             <a:endParaRPr lang="fr-FR"/>
           </a:p>
@@ -666,7 +667,7 @@
           <a:p>
             <a:fld id="{06639CF7-1097-4C3B-8127-169A3EEBE66B}" type="datetimeFigureOut">
               <a:rPr lang="fr-FR" smtClean="0"/>
-              <a:t>01/10/2025</a:t>
+              <a:t>07/10/2025</a:t>
             </a:fld>
             <a:endParaRPr lang="fr-FR"/>
           </a:p>
@@ -864,7 +865,7 @@
           <a:p>
             <a:fld id="{06639CF7-1097-4C3B-8127-169A3EEBE66B}" type="datetimeFigureOut">
               <a:rPr lang="fr-FR" smtClean="0"/>
-              <a:t>01/10/2025</a:t>
+              <a:t>07/10/2025</a:t>
             </a:fld>
             <a:endParaRPr lang="fr-FR"/>
           </a:p>
@@ -1139,7 +1140,7 @@
           <a:p>
             <a:fld id="{06639CF7-1097-4C3B-8127-169A3EEBE66B}" type="datetimeFigureOut">
               <a:rPr lang="fr-FR" smtClean="0"/>
-              <a:t>01/10/2025</a:t>
+              <a:t>07/10/2025</a:t>
             </a:fld>
             <a:endParaRPr lang="fr-FR"/>
           </a:p>
@@ -1404,7 +1405,7 @@
           <a:p>
             <a:fld id="{06639CF7-1097-4C3B-8127-169A3EEBE66B}" type="datetimeFigureOut">
               <a:rPr lang="fr-FR" smtClean="0"/>
-              <a:t>01/10/2025</a:t>
+              <a:t>07/10/2025</a:t>
             </a:fld>
             <a:endParaRPr lang="fr-FR"/>
           </a:p>
@@ -1816,7 +1817,7 @@
           <a:p>
             <a:fld id="{06639CF7-1097-4C3B-8127-169A3EEBE66B}" type="datetimeFigureOut">
               <a:rPr lang="fr-FR" smtClean="0"/>
-              <a:t>01/10/2025</a:t>
+              <a:t>07/10/2025</a:t>
             </a:fld>
             <a:endParaRPr lang="fr-FR"/>
           </a:p>
@@ -1957,7 +1958,7 @@
           <a:p>
             <a:fld id="{06639CF7-1097-4C3B-8127-169A3EEBE66B}" type="datetimeFigureOut">
               <a:rPr lang="fr-FR" smtClean="0"/>
-              <a:t>01/10/2025</a:t>
+              <a:t>07/10/2025</a:t>
             </a:fld>
             <a:endParaRPr lang="fr-FR"/>
           </a:p>
@@ -2070,7 +2071,7 @@
           <a:p>
             <a:fld id="{06639CF7-1097-4C3B-8127-169A3EEBE66B}" type="datetimeFigureOut">
               <a:rPr lang="fr-FR" smtClean="0"/>
-              <a:t>01/10/2025</a:t>
+              <a:t>07/10/2025</a:t>
             </a:fld>
             <a:endParaRPr lang="fr-FR"/>
           </a:p>
@@ -2381,7 +2382,7 @@
           <a:p>
             <a:fld id="{06639CF7-1097-4C3B-8127-169A3EEBE66B}" type="datetimeFigureOut">
               <a:rPr lang="fr-FR" smtClean="0"/>
-              <a:t>01/10/2025</a:t>
+              <a:t>07/10/2025</a:t>
             </a:fld>
             <a:endParaRPr lang="fr-FR"/>
           </a:p>
@@ -2669,7 +2670,7 @@
           <a:p>
             <a:fld id="{06639CF7-1097-4C3B-8127-169A3EEBE66B}" type="datetimeFigureOut">
               <a:rPr lang="fr-FR" smtClean="0"/>
-              <a:t>01/10/2025</a:t>
+              <a:t>07/10/2025</a:t>
             </a:fld>
             <a:endParaRPr lang="fr-FR"/>
           </a:p>
@@ -2910,7 +2911,7 @@
           <a:p>
             <a:fld id="{06639CF7-1097-4C3B-8127-169A3EEBE66B}" type="datetimeFigureOut">
               <a:rPr lang="fr-FR" smtClean="0"/>
-              <a:t>01/10/2025</a:t>
+              <a:t>07/10/2025</a:t>
             </a:fld>
             <a:endParaRPr lang="fr-FR"/>
           </a:p>
@@ -6859,6 +6860,1602 @@
 </p:sld>
 </file>
 
+<file path=ppt/slides/slide3.xml><?xml version="1.0" encoding="utf-8"?>
+<p:sld xmlns:a="http://schemas.openxmlformats.org/drawingml/2006/main" xmlns:r="http://schemas.openxmlformats.org/officeDocument/2006/relationships" xmlns:p="http://schemas.openxmlformats.org/presentationml/2006/main">
+  <p:cSld>
+    <p:bg>
+      <p:bgPr>
+        <a:gradFill flip="none" rotWithShape="1">
+          <a:gsLst>
+            <a:gs pos="23000">
+              <a:srgbClr val="0070C0"/>
+            </a:gs>
+            <a:gs pos="72000">
+              <a:schemeClr val="tx1"/>
+            </a:gs>
+          </a:gsLst>
+          <a:lin ang="2700000" scaled="1"/>
+          <a:tileRect/>
+        </a:gradFill>
+        <a:effectLst/>
+      </p:bgPr>
+    </p:bg>
+    <p:spTree>
+      <p:nvGrpSpPr>
+        <p:cNvPr id="1" name=""/>
+        <p:cNvGrpSpPr/>
+        <p:nvPr/>
+      </p:nvGrpSpPr>
+      <p:grpSpPr>
+        <a:xfrm>
+          <a:off x="0" y="0"/>
+          <a:ext cx="0" cy="0"/>
+          <a:chOff x="0" y="0"/>
+          <a:chExt cx="0" cy="0"/>
+        </a:xfrm>
+      </p:grpSpPr>
+      <p:sp>
+        <p:nvSpPr>
+          <p:cNvPr id="8" name="Rectangle 7">
+            <a:extLst>
+              <a:ext uri="{FF2B5EF4-FFF2-40B4-BE49-F238E27FC236}">
+                <a16:creationId xmlns:a16="http://schemas.microsoft.com/office/drawing/2014/main" id="{B0ACCB2C-D838-E6F7-AB35-61E80D082538}"/>
+              </a:ext>
+            </a:extLst>
+          </p:cNvPr>
+          <p:cNvSpPr/>
+          <p:nvPr/>
+        </p:nvSpPr>
+        <p:spPr>
+          <a:xfrm>
+            <a:off x="3359852" y="98385"/>
+            <a:ext cx="2550368" cy="780661"/>
+          </a:xfrm>
+          <a:prstGeom prst="rect">
+            <a:avLst/>
+          </a:prstGeom>
+          <a:solidFill>
+            <a:schemeClr val="tx1">
+              <a:lumMod val="75000"/>
+              <a:lumOff val="25000"/>
+            </a:schemeClr>
+          </a:solidFill>
+          <a:ln w="19050">
+            <a:gradFill>
+              <a:gsLst>
+                <a:gs pos="0">
+                  <a:schemeClr val="bg1"/>
+                </a:gs>
+                <a:gs pos="42000">
+                  <a:schemeClr val="tx1">
+                    <a:lumMod val="75000"/>
+                    <a:lumOff val="25000"/>
+                  </a:schemeClr>
+                </a:gs>
+              </a:gsLst>
+              <a:lin ang="3000000" scaled="0"/>
+            </a:gradFill>
+          </a:ln>
+          <a:effectLst>
+            <a:outerShdw blurRad="304800" dist="50800" dir="2700000" algn="ctr" rotWithShape="0">
+              <a:srgbClr val="000000"/>
+            </a:outerShdw>
+          </a:effectLst>
+        </p:spPr>
+        <p:style>
+          <a:lnRef idx="2">
+            <a:schemeClr val="accent1">
+              <a:shade val="15000"/>
+            </a:schemeClr>
+          </a:lnRef>
+          <a:fillRef idx="1">
+            <a:schemeClr val="accent1"/>
+          </a:fillRef>
+          <a:effectRef idx="0">
+            <a:schemeClr val="accent1"/>
+          </a:effectRef>
+          <a:fontRef idx="minor">
+            <a:schemeClr val="lt1"/>
+          </a:fontRef>
+        </p:style>
+        <p:txBody>
+          <a:bodyPr rtlCol="0" anchor="ctr"/>
+          <a:lstStyle/>
+          <a:p>
+            <a:pPr algn="ctr"/>
+            <a:endParaRPr lang="fr-FR" dirty="0">
+              <a:solidFill>
+                <a:srgbClr val="FF0000"/>
+              </a:solidFill>
+            </a:endParaRPr>
+          </a:p>
+        </p:txBody>
+      </p:sp>
+      <p:sp>
+        <p:nvSpPr>
+          <p:cNvPr id="9" name="Rectangle 8">
+            <a:extLst>
+              <a:ext uri="{FF2B5EF4-FFF2-40B4-BE49-F238E27FC236}">
+                <a16:creationId xmlns:a16="http://schemas.microsoft.com/office/drawing/2014/main" id="{B7DFAAEA-684E-5A46-C0BE-2C759F87F19A}"/>
+              </a:ext>
+            </a:extLst>
+          </p:cNvPr>
+          <p:cNvSpPr/>
+          <p:nvPr/>
+        </p:nvSpPr>
+        <p:spPr>
+          <a:xfrm>
+            <a:off x="6276760" y="98384"/>
+            <a:ext cx="2550368" cy="780661"/>
+          </a:xfrm>
+          <a:prstGeom prst="rect">
+            <a:avLst/>
+          </a:prstGeom>
+          <a:solidFill>
+            <a:schemeClr val="tx1">
+              <a:lumMod val="75000"/>
+              <a:lumOff val="25000"/>
+            </a:schemeClr>
+          </a:solidFill>
+          <a:ln w="19050">
+            <a:gradFill>
+              <a:gsLst>
+                <a:gs pos="0">
+                  <a:schemeClr val="bg1"/>
+                </a:gs>
+                <a:gs pos="42000">
+                  <a:schemeClr val="tx1">
+                    <a:lumMod val="75000"/>
+                    <a:lumOff val="25000"/>
+                  </a:schemeClr>
+                </a:gs>
+              </a:gsLst>
+              <a:lin ang="3000000" scaled="0"/>
+            </a:gradFill>
+          </a:ln>
+          <a:effectLst>
+            <a:outerShdw blurRad="304800" dist="50800" dir="2700000" algn="ctr" rotWithShape="0">
+              <a:srgbClr val="000000"/>
+            </a:outerShdw>
+          </a:effectLst>
+        </p:spPr>
+        <p:style>
+          <a:lnRef idx="2">
+            <a:schemeClr val="accent1">
+              <a:shade val="15000"/>
+            </a:schemeClr>
+          </a:lnRef>
+          <a:fillRef idx="1">
+            <a:schemeClr val="accent1"/>
+          </a:fillRef>
+          <a:effectRef idx="0">
+            <a:schemeClr val="accent1"/>
+          </a:effectRef>
+          <a:fontRef idx="minor">
+            <a:schemeClr val="lt1"/>
+          </a:fontRef>
+        </p:style>
+        <p:txBody>
+          <a:bodyPr rtlCol="0" anchor="ctr"/>
+          <a:lstStyle/>
+          <a:p>
+            <a:pPr algn="ctr"/>
+            <a:endParaRPr lang="fr-FR" dirty="0">
+              <a:solidFill>
+                <a:srgbClr val="FF0000"/>
+              </a:solidFill>
+            </a:endParaRPr>
+          </a:p>
+        </p:txBody>
+      </p:sp>
+      <p:sp>
+        <p:nvSpPr>
+          <p:cNvPr id="10" name="Rectangle 9">
+            <a:extLst>
+              <a:ext uri="{FF2B5EF4-FFF2-40B4-BE49-F238E27FC236}">
+                <a16:creationId xmlns:a16="http://schemas.microsoft.com/office/drawing/2014/main" id="{8F7958CF-2E13-4BD0-568C-C8C8AB0AF47E}"/>
+              </a:ext>
+            </a:extLst>
+          </p:cNvPr>
+          <p:cNvSpPr/>
+          <p:nvPr/>
+        </p:nvSpPr>
+        <p:spPr>
+          <a:xfrm>
+            <a:off x="9193668" y="98384"/>
+            <a:ext cx="2550368" cy="780661"/>
+          </a:xfrm>
+          <a:prstGeom prst="rect">
+            <a:avLst/>
+          </a:prstGeom>
+          <a:solidFill>
+            <a:schemeClr val="tx1">
+              <a:lumMod val="75000"/>
+              <a:lumOff val="25000"/>
+            </a:schemeClr>
+          </a:solidFill>
+          <a:ln w="19050">
+            <a:gradFill>
+              <a:gsLst>
+                <a:gs pos="0">
+                  <a:schemeClr val="bg1"/>
+                </a:gs>
+                <a:gs pos="42000">
+                  <a:schemeClr val="tx1">
+                    <a:lumMod val="75000"/>
+                    <a:lumOff val="25000"/>
+                  </a:schemeClr>
+                </a:gs>
+              </a:gsLst>
+              <a:lin ang="3000000" scaled="0"/>
+            </a:gradFill>
+          </a:ln>
+          <a:effectLst>
+            <a:outerShdw blurRad="304800" dist="50800" dir="2700000" algn="ctr" rotWithShape="0">
+              <a:srgbClr val="000000"/>
+            </a:outerShdw>
+          </a:effectLst>
+        </p:spPr>
+        <p:style>
+          <a:lnRef idx="2">
+            <a:schemeClr val="accent1">
+              <a:shade val="15000"/>
+            </a:schemeClr>
+          </a:lnRef>
+          <a:fillRef idx="1">
+            <a:schemeClr val="accent1"/>
+          </a:fillRef>
+          <a:effectRef idx="0">
+            <a:schemeClr val="accent1"/>
+          </a:effectRef>
+          <a:fontRef idx="minor">
+            <a:schemeClr val="lt1"/>
+          </a:fontRef>
+        </p:style>
+        <p:txBody>
+          <a:bodyPr rtlCol="0" anchor="ctr"/>
+          <a:lstStyle/>
+          <a:p>
+            <a:pPr algn="ctr"/>
+            <a:endParaRPr lang="fr-FR" dirty="0">
+              <a:solidFill>
+                <a:srgbClr val="FF0000"/>
+              </a:solidFill>
+            </a:endParaRPr>
+          </a:p>
+        </p:txBody>
+      </p:sp>
+      <p:sp>
+        <p:nvSpPr>
+          <p:cNvPr id="12" name="Rectangle 11">
+            <a:extLst>
+              <a:ext uri="{FF2B5EF4-FFF2-40B4-BE49-F238E27FC236}">
+                <a16:creationId xmlns:a16="http://schemas.microsoft.com/office/drawing/2014/main" id="{6BF2139C-AF4C-C771-EEEF-8D69D451FD2C}"/>
+              </a:ext>
+            </a:extLst>
+          </p:cNvPr>
+          <p:cNvSpPr/>
+          <p:nvPr/>
+        </p:nvSpPr>
+        <p:spPr>
+          <a:xfrm>
+            <a:off x="3218289" y="1045695"/>
+            <a:ext cx="2833493" cy="2798513"/>
+          </a:xfrm>
+          <a:prstGeom prst="rect">
+            <a:avLst/>
+          </a:prstGeom>
+          <a:solidFill>
+            <a:schemeClr val="tx1">
+              <a:lumMod val="75000"/>
+              <a:lumOff val="25000"/>
+            </a:schemeClr>
+          </a:solidFill>
+          <a:ln w="19050">
+            <a:gradFill>
+              <a:gsLst>
+                <a:gs pos="0">
+                  <a:schemeClr val="bg1"/>
+                </a:gs>
+                <a:gs pos="42000">
+                  <a:schemeClr val="tx1">
+                    <a:lumMod val="75000"/>
+                    <a:lumOff val="25000"/>
+                  </a:schemeClr>
+                </a:gs>
+              </a:gsLst>
+              <a:lin ang="3000000" scaled="0"/>
+            </a:gradFill>
+          </a:ln>
+          <a:effectLst>
+            <a:outerShdw blurRad="304800" dist="50800" dir="2700000" algn="ctr" rotWithShape="0">
+              <a:srgbClr val="000000"/>
+            </a:outerShdw>
+          </a:effectLst>
+        </p:spPr>
+        <p:style>
+          <a:lnRef idx="2">
+            <a:schemeClr val="accent1">
+              <a:shade val="15000"/>
+            </a:schemeClr>
+          </a:lnRef>
+          <a:fillRef idx="1">
+            <a:schemeClr val="accent1"/>
+          </a:fillRef>
+          <a:effectRef idx="0">
+            <a:schemeClr val="accent1"/>
+          </a:effectRef>
+          <a:fontRef idx="minor">
+            <a:schemeClr val="lt1"/>
+          </a:fontRef>
+        </p:style>
+        <p:txBody>
+          <a:bodyPr rtlCol="0" anchor="ctr"/>
+          <a:lstStyle/>
+          <a:p>
+            <a:pPr algn="ctr"/>
+            <a:endParaRPr lang="fr-FR" dirty="0">
+              <a:solidFill>
+                <a:srgbClr val="FF0000"/>
+              </a:solidFill>
+            </a:endParaRPr>
+          </a:p>
+        </p:txBody>
+      </p:sp>
+      <p:sp>
+        <p:nvSpPr>
+          <p:cNvPr id="13" name="Rectangle 12">
+            <a:extLst>
+              <a:ext uri="{FF2B5EF4-FFF2-40B4-BE49-F238E27FC236}">
+                <a16:creationId xmlns:a16="http://schemas.microsoft.com/office/drawing/2014/main" id="{057FF7E4-4075-3394-03D6-FB1413775564}"/>
+              </a:ext>
+            </a:extLst>
+          </p:cNvPr>
+          <p:cNvSpPr/>
+          <p:nvPr/>
+        </p:nvSpPr>
+        <p:spPr>
+          <a:xfrm>
+            <a:off x="6346122" y="1045695"/>
+            <a:ext cx="5675100" cy="2798513"/>
+          </a:xfrm>
+          <a:prstGeom prst="rect">
+            <a:avLst/>
+          </a:prstGeom>
+          <a:solidFill>
+            <a:schemeClr val="tx1">
+              <a:lumMod val="75000"/>
+              <a:lumOff val="25000"/>
+            </a:schemeClr>
+          </a:solidFill>
+          <a:ln w="19050">
+            <a:gradFill>
+              <a:gsLst>
+                <a:gs pos="0">
+                  <a:schemeClr val="bg1"/>
+                </a:gs>
+                <a:gs pos="42000">
+                  <a:schemeClr val="tx1">
+                    <a:lumMod val="75000"/>
+                    <a:lumOff val="25000"/>
+                  </a:schemeClr>
+                </a:gs>
+              </a:gsLst>
+              <a:lin ang="3000000" scaled="0"/>
+            </a:gradFill>
+          </a:ln>
+          <a:effectLst>
+            <a:outerShdw blurRad="304800" dist="50800" dir="2700000" algn="ctr" rotWithShape="0">
+              <a:srgbClr val="000000"/>
+            </a:outerShdw>
+          </a:effectLst>
+        </p:spPr>
+        <p:style>
+          <a:lnRef idx="2">
+            <a:schemeClr val="accent1">
+              <a:shade val="15000"/>
+            </a:schemeClr>
+          </a:lnRef>
+          <a:fillRef idx="1">
+            <a:schemeClr val="accent1"/>
+          </a:fillRef>
+          <a:effectRef idx="0">
+            <a:schemeClr val="accent1"/>
+          </a:effectRef>
+          <a:fontRef idx="minor">
+            <a:schemeClr val="lt1"/>
+          </a:fontRef>
+        </p:style>
+        <p:txBody>
+          <a:bodyPr rtlCol="0" anchor="ctr"/>
+          <a:lstStyle/>
+          <a:p>
+            <a:pPr algn="ctr"/>
+            <a:endParaRPr lang="fr-FR" dirty="0">
+              <a:solidFill>
+                <a:srgbClr val="FF0000"/>
+              </a:solidFill>
+            </a:endParaRPr>
+          </a:p>
+        </p:txBody>
+      </p:sp>
+      <p:sp>
+        <p:nvSpPr>
+          <p:cNvPr id="14" name="Rectangle 13">
+            <a:extLst>
+              <a:ext uri="{FF2B5EF4-FFF2-40B4-BE49-F238E27FC236}">
+                <a16:creationId xmlns:a16="http://schemas.microsoft.com/office/drawing/2014/main" id="{EE28302D-A64A-B3B8-21AD-4C69ED6B622C}"/>
+              </a:ext>
+            </a:extLst>
+          </p:cNvPr>
+          <p:cNvSpPr/>
+          <p:nvPr/>
+        </p:nvSpPr>
+        <p:spPr>
+          <a:xfrm>
+            <a:off x="7495115" y="4010860"/>
+            <a:ext cx="4526107" cy="2623206"/>
+          </a:xfrm>
+          <a:prstGeom prst="rect">
+            <a:avLst/>
+          </a:prstGeom>
+          <a:solidFill>
+            <a:schemeClr val="tx1">
+              <a:lumMod val="75000"/>
+              <a:lumOff val="25000"/>
+            </a:schemeClr>
+          </a:solidFill>
+          <a:ln w="19050">
+            <a:gradFill>
+              <a:gsLst>
+                <a:gs pos="0">
+                  <a:schemeClr val="bg1"/>
+                </a:gs>
+                <a:gs pos="42000">
+                  <a:schemeClr val="tx1">
+                    <a:lumMod val="75000"/>
+                    <a:lumOff val="25000"/>
+                  </a:schemeClr>
+                </a:gs>
+              </a:gsLst>
+              <a:lin ang="3000000" scaled="0"/>
+            </a:gradFill>
+          </a:ln>
+          <a:effectLst>
+            <a:outerShdw blurRad="304800" dist="50800" dir="2700000" algn="ctr" rotWithShape="0">
+              <a:srgbClr val="000000"/>
+            </a:outerShdw>
+          </a:effectLst>
+        </p:spPr>
+        <p:style>
+          <a:lnRef idx="2">
+            <a:schemeClr val="accent1">
+              <a:shade val="15000"/>
+            </a:schemeClr>
+          </a:lnRef>
+          <a:fillRef idx="1">
+            <a:schemeClr val="accent1"/>
+          </a:fillRef>
+          <a:effectRef idx="0">
+            <a:schemeClr val="accent1"/>
+          </a:effectRef>
+          <a:fontRef idx="minor">
+            <a:schemeClr val="lt1"/>
+          </a:fontRef>
+        </p:style>
+        <p:txBody>
+          <a:bodyPr rtlCol="0" anchor="ctr"/>
+          <a:lstStyle/>
+          <a:p>
+            <a:pPr algn="ctr"/>
+            <a:endParaRPr lang="fr-FR" dirty="0">
+              <a:solidFill>
+                <a:srgbClr val="FF0000"/>
+              </a:solidFill>
+            </a:endParaRPr>
+          </a:p>
+        </p:txBody>
+      </p:sp>
+      <p:sp>
+        <p:nvSpPr>
+          <p:cNvPr id="15" name="Rectangle 14">
+            <a:extLst>
+              <a:ext uri="{FF2B5EF4-FFF2-40B4-BE49-F238E27FC236}">
+                <a16:creationId xmlns:a16="http://schemas.microsoft.com/office/drawing/2014/main" id="{1133DD72-00D6-605F-7122-591C9C6B37E0}"/>
+              </a:ext>
+            </a:extLst>
+          </p:cNvPr>
+          <p:cNvSpPr/>
+          <p:nvPr/>
+        </p:nvSpPr>
+        <p:spPr>
+          <a:xfrm>
+            <a:off x="4161042" y="4010860"/>
+            <a:ext cx="2968785" cy="2623206"/>
+          </a:xfrm>
+          <a:prstGeom prst="rect">
+            <a:avLst/>
+          </a:prstGeom>
+          <a:solidFill>
+            <a:schemeClr val="tx1">
+              <a:lumMod val="75000"/>
+              <a:lumOff val="25000"/>
+            </a:schemeClr>
+          </a:solidFill>
+          <a:ln w="19050">
+            <a:gradFill>
+              <a:gsLst>
+                <a:gs pos="0">
+                  <a:schemeClr val="bg1"/>
+                </a:gs>
+                <a:gs pos="42000">
+                  <a:schemeClr val="tx1">
+                    <a:lumMod val="75000"/>
+                    <a:lumOff val="25000"/>
+                  </a:schemeClr>
+                </a:gs>
+              </a:gsLst>
+              <a:lin ang="3000000" scaled="0"/>
+            </a:gradFill>
+          </a:ln>
+          <a:effectLst>
+            <a:outerShdw blurRad="304800" dist="50800" dir="2700000" algn="ctr" rotWithShape="0">
+              <a:srgbClr val="000000"/>
+            </a:outerShdw>
+          </a:effectLst>
+        </p:spPr>
+        <p:style>
+          <a:lnRef idx="2">
+            <a:schemeClr val="accent1">
+              <a:shade val="15000"/>
+            </a:schemeClr>
+          </a:lnRef>
+          <a:fillRef idx="1">
+            <a:schemeClr val="accent1"/>
+          </a:fillRef>
+          <a:effectRef idx="0">
+            <a:schemeClr val="accent1"/>
+          </a:effectRef>
+          <a:fontRef idx="minor">
+            <a:schemeClr val="lt1"/>
+          </a:fontRef>
+        </p:style>
+        <p:txBody>
+          <a:bodyPr rtlCol="0" anchor="ctr"/>
+          <a:lstStyle/>
+          <a:p>
+            <a:pPr algn="ctr"/>
+            <a:endParaRPr lang="fr-FR" dirty="0">
+              <a:solidFill>
+                <a:srgbClr val="FF0000"/>
+              </a:solidFill>
+            </a:endParaRPr>
+          </a:p>
+        </p:txBody>
+      </p:sp>
+      <p:sp>
+        <p:nvSpPr>
+          <p:cNvPr id="16" name="Rectangle 15">
+            <a:extLst>
+              <a:ext uri="{FF2B5EF4-FFF2-40B4-BE49-F238E27FC236}">
+                <a16:creationId xmlns:a16="http://schemas.microsoft.com/office/drawing/2014/main" id="{D87566AB-9EEB-2FC1-BA18-2331C9ACDA61}"/>
+              </a:ext>
+            </a:extLst>
+          </p:cNvPr>
+          <p:cNvSpPr/>
+          <p:nvPr/>
+        </p:nvSpPr>
+        <p:spPr>
+          <a:xfrm>
+            <a:off x="833059" y="4010860"/>
+            <a:ext cx="2962696" cy="2623206"/>
+          </a:xfrm>
+          <a:prstGeom prst="rect">
+            <a:avLst/>
+          </a:prstGeom>
+          <a:solidFill>
+            <a:schemeClr val="tx1">
+              <a:lumMod val="75000"/>
+              <a:lumOff val="25000"/>
+            </a:schemeClr>
+          </a:solidFill>
+          <a:ln w="19050">
+            <a:gradFill>
+              <a:gsLst>
+                <a:gs pos="0">
+                  <a:schemeClr val="bg1"/>
+                </a:gs>
+                <a:gs pos="42000">
+                  <a:schemeClr val="tx1">
+                    <a:lumMod val="75000"/>
+                    <a:lumOff val="25000"/>
+                  </a:schemeClr>
+                </a:gs>
+              </a:gsLst>
+              <a:lin ang="3000000" scaled="0"/>
+            </a:gradFill>
+          </a:ln>
+          <a:effectLst>
+            <a:outerShdw blurRad="304800" dist="50800" dir="2700000" algn="ctr" rotWithShape="0">
+              <a:srgbClr val="000000"/>
+            </a:outerShdw>
+          </a:effectLst>
+        </p:spPr>
+        <p:style>
+          <a:lnRef idx="2">
+            <a:schemeClr val="accent1">
+              <a:shade val="15000"/>
+            </a:schemeClr>
+          </a:lnRef>
+          <a:fillRef idx="1">
+            <a:schemeClr val="accent1"/>
+          </a:fillRef>
+          <a:effectRef idx="0">
+            <a:schemeClr val="accent1"/>
+          </a:effectRef>
+          <a:fontRef idx="minor">
+            <a:schemeClr val="lt1"/>
+          </a:fontRef>
+        </p:style>
+        <p:txBody>
+          <a:bodyPr rtlCol="0" anchor="ctr"/>
+          <a:lstStyle/>
+          <a:p>
+            <a:pPr algn="ctr"/>
+            <a:endParaRPr lang="fr-FR" dirty="0">
+              <a:solidFill>
+                <a:srgbClr val="FF0000"/>
+              </a:solidFill>
+            </a:endParaRPr>
+          </a:p>
+        </p:txBody>
+      </p:sp>
+      <p:sp>
+        <p:nvSpPr>
+          <p:cNvPr id="17" name="ZoneTexte 16">
+            <a:extLst>
+              <a:ext uri="{FF2B5EF4-FFF2-40B4-BE49-F238E27FC236}">
+                <a16:creationId xmlns:a16="http://schemas.microsoft.com/office/drawing/2014/main" id="{13CE6E2D-49FA-FE9B-05F6-AAAE504A22B5}"/>
+              </a:ext>
+            </a:extLst>
+          </p:cNvPr>
+          <p:cNvSpPr txBox="1"/>
+          <p:nvPr/>
+        </p:nvSpPr>
+        <p:spPr>
+          <a:xfrm rot="16200000">
+            <a:off x="-1959321" y="3502940"/>
+            <a:ext cx="4737062" cy="707886"/>
+          </a:xfrm>
+          <a:prstGeom prst="rect">
+            <a:avLst/>
+          </a:prstGeom>
+          <a:noFill/>
+        </p:spPr>
+        <p:txBody>
+          <a:bodyPr wrap="square" rtlCol="0">
+            <a:spAutoFit/>
+          </a:bodyPr>
+          <a:lstStyle/>
+          <a:p>
+            <a:r>
+              <a:rPr lang="en-GB" sz="2000" dirty="0">
+                <a:solidFill>
+                  <a:schemeClr val="bg1"/>
+                </a:solidFill>
+              </a:rPr>
+              <a:t>Product and category performance analysis</a:t>
+            </a:r>
+            <a:br>
+              <a:rPr lang="en-GB" sz="2000" dirty="0">
+                <a:solidFill>
+                  <a:schemeClr val="bg1"/>
+                </a:solidFill>
+              </a:rPr>
+            </a:br>
+            <a:r>
+              <a:rPr lang="en-GB" sz="2000" dirty="0">
+                <a:solidFill>
+                  <a:schemeClr val="bg1"/>
+                </a:solidFill>
+              </a:rPr>
+              <a:t>2018-2019</a:t>
+            </a:r>
+            <a:endParaRPr lang="fr-FR" sz="2000" dirty="0">
+              <a:solidFill>
+                <a:schemeClr val="bg1"/>
+              </a:solidFill>
+            </a:endParaRPr>
+          </a:p>
+        </p:txBody>
+      </p:sp>
+      <p:sp>
+        <p:nvSpPr>
+          <p:cNvPr id="20" name="Rectangle : avec coins arrondis en diagonale 19">
+            <a:extLst>
+              <a:ext uri="{FF2B5EF4-FFF2-40B4-BE49-F238E27FC236}">
+                <a16:creationId xmlns:a16="http://schemas.microsoft.com/office/drawing/2014/main" id="{6B7821F9-FA56-B408-6B29-C279C205C7D0}"/>
+              </a:ext>
+            </a:extLst>
+          </p:cNvPr>
+          <p:cNvSpPr/>
+          <p:nvPr/>
+        </p:nvSpPr>
+        <p:spPr>
+          <a:xfrm>
+            <a:off x="121391" y="1402774"/>
+            <a:ext cx="585191" cy="4886188"/>
+          </a:xfrm>
+          <a:prstGeom prst="round2DiagRect">
+            <a:avLst>
+              <a:gd name="adj1" fmla="val 50000"/>
+              <a:gd name="adj2" fmla="val 0"/>
+            </a:avLst>
+          </a:prstGeom>
+          <a:solidFill>
+            <a:schemeClr val="bg1">
+              <a:alpha val="45000"/>
+            </a:schemeClr>
+          </a:solidFill>
+          <a:ln>
+            <a:noFill/>
+          </a:ln>
+        </p:spPr>
+        <p:style>
+          <a:lnRef idx="1">
+            <a:schemeClr val="dk1"/>
+          </a:lnRef>
+          <a:fillRef idx="2">
+            <a:schemeClr val="dk1"/>
+          </a:fillRef>
+          <a:effectRef idx="1">
+            <a:schemeClr val="dk1"/>
+          </a:effectRef>
+          <a:fontRef idx="minor">
+            <a:schemeClr val="dk1"/>
+          </a:fontRef>
+        </p:style>
+        <p:txBody>
+          <a:bodyPr rtlCol="0" anchor="ctr"/>
+          <a:lstStyle/>
+          <a:p>
+            <a:pPr algn="ctr"/>
+            <a:endParaRPr lang="fr-FR" dirty="0"/>
+          </a:p>
+        </p:txBody>
+      </p:sp>
+      <p:sp>
+        <p:nvSpPr>
+          <p:cNvPr id="29" name="Rectangle 28">
+            <a:extLst>
+              <a:ext uri="{FF2B5EF4-FFF2-40B4-BE49-F238E27FC236}">
+                <a16:creationId xmlns:a16="http://schemas.microsoft.com/office/drawing/2014/main" id="{890CEA66-30EC-30A3-2BF4-64A4229A61FA}"/>
+              </a:ext>
+            </a:extLst>
+          </p:cNvPr>
+          <p:cNvSpPr/>
+          <p:nvPr/>
+        </p:nvSpPr>
+        <p:spPr>
+          <a:xfrm>
+            <a:off x="981850" y="1256580"/>
+            <a:ext cx="2055035" cy="2265938"/>
+          </a:xfrm>
+          <a:prstGeom prst="rect">
+            <a:avLst/>
+          </a:prstGeom>
+          <a:solidFill>
+            <a:schemeClr val="tx1">
+              <a:lumMod val="75000"/>
+              <a:lumOff val="25000"/>
+            </a:schemeClr>
+          </a:solidFill>
+          <a:ln w="19050">
+            <a:gradFill>
+              <a:gsLst>
+                <a:gs pos="0">
+                  <a:schemeClr val="bg1"/>
+                </a:gs>
+                <a:gs pos="42000">
+                  <a:schemeClr val="tx1">
+                    <a:lumMod val="75000"/>
+                    <a:lumOff val="25000"/>
+                  </a:schemeClr>
+                </a:gs>
+              </a:gsLst>
+              <a:lin ang="3000000" scaled="0"/>
+            </a:gradFill>
+          </a:ln>
+          <a:effectLst>
+            <a:outerShdw blurRad="304800" dist="50800" dir="2700000" algn="ctr" rotWithShape="0">
+              <a:srgbClr val="000000"/>
+            </a:outerShdw>
+          </a:effectLst>
+        </p:spPr>
+        <p:style>
+          <a:lnRef idx="2">
+            <a:schemeClr val="accent1">
+              <a:shade val="15000"/>
+            </a:schemeClr>
+          </a:lnRef>
+          <a:fillRef idx="1">
+            <a:schemeClr val="accent1"/>
+          </a:fillRef>
+          <a:effectRef idx="0">
+            <a:schemeClr val="accent1"/>
+          </a:effectRef>
+          <a:fontRef idx="minor">
+            <a:schemeClr val="lt1"/>
+          </a:fontRef>
+        </p:style>
+        <p:txBody>
+          <a:bodyPr rtlCol="0" anchor="ctr"/>
+          <a:lstStyle/>
+          <a:p>
+            <a:pPr algn="ctr"/>
+            <a:endParaRPr lang="fr-FR" dirty="0">
+              <a:solidFill>
+                <a:srgbClr val="FF0000"/>
+              </a:solidFill>
+            </a:endParaRPr>
+          </a:p>
+        </p:txBody>
+      </p:sp>
+      <p:sp>
+        <p:nvSpPr>
+          <p:cNvPr id="21" name="ZoneTexte 20">
+            <a:extLst>
+              <a:ext uri="{FF2B5EF4-FFF2-40B4-BE49-F238E27FC236}">
+                <a16:creationId xmlns:a16="http://schemas.microsoft.com/office/drawing/2014/main" id="{C3972203-C2D7-AE0B-2A4D-51C62A8F3488}"/>
+              </a:ext>
+            </a:extLst>
+          </p:cNvPr>
+          <p:cNvSpPr txBox="1"/>
+          <p:nvPr/>
+        </p:nvSpPr>
+        <p:spPr>
+          <a:xfrm>
+            <a:off x="944556" y="1256580"/>
+            <a:ext cx="2092329" cy="276999"/>
+          </a:xfrm>
+          <a:prstGeom prst="rect">
+            <a:avLst/>
+          </a:prstGeom>
+          <a:noFill/>
+        </p:spPr>
+        <p:txBody>
+          <a:bodyPr wrap="square" rtlCol="0">
+            <a:spAutoFit/>
+          </a:bodyPr>
+          <a:lstStyle/>
+          <a:p>
+            <a:pPr algn="ctr"/>
+            <a:r>
+              <a:rPr lang="fr-FR" sz="1200" b="1" i="1" dirty="0">
+                <a:solidFill>
+                  <a:srgbClr val="FEBB05"/>
+                </a:solidFill>
+              </a:rPr>
+              <a:t>TOP PROFIT SUB-CATEGORY</a:t>
+            </a:r>
+          </a:p>
+        </p:txBody>
+      </p:sp>
+      <p:sp>
+        <p:nvSpPr>
+          <p:cNvPr id="22" name="ZoneTexte 21">
+            <a:extLst>
+              <a:ext uri="{FF2B5EF4-FFF2-40B4-BE49-F238E27FC236}">
+                <a16:creationId xmlns:a16="http://schemas.microsoft.com/office/drawing/2014/main" id="{8C97D92B-9AFD-DE2D-DEDD-E4B96BB34C24}"/>
+              </a:ext>
+            </a:extLst>
+          </p:cNvPr>
+          <p:cNvSpPr txBox="1"/>
+          <p:nvPr/>
+        </p:nvSpPr>
+        <p:spPr>
+          <a:xfrm>
+            <a:off x="6266764" y="73914"/>
+            <a:ext cx="2378867" cy="292388"/>
+          </a:xfrm>
+          <a:prstGeom prst="rect">
+            <a:avLst/>
+          </a:prstGeom>
+          <a:noFill/>
+        </p:spPr>
+        <p:txBody>
+          <a:bodyPr wrap="square" rtlCol="0">
+            <a:spAutoFit/>
+          </a:bodyPr>
+          <a:lstStyle/>
+          <a:p>
+            <a:pPr algn="ctr"/>
+            <a:r>
+              <a:rPr lang="fr-FR" sz="1300" b="1" dirty="0">
+                <a:solidFill>
+                  <a:schemeClr val="bg1"/>
+                </a:solidFill>
+              </a:rPr>
+              <a:t>TOP QUANTITY SUB-CATEGORY</a:t>
+            </a:r>
+          </a:p>
+        </p:txBody>
+      </p:sp>
+      <p:sp>
+        <p:nvSpPr>
+          <p:cNvPr id="23" name="ZoneTexte 22">
+            <a:extLst>
+              <a:ext uri="{FF2B5EF4-FFF2-40B4-BE49-F238E27FC236}">
+                <a16:creationId xmlns:a16="http://schemas.microsoft.com/office/drawing/2014/main" id="{3885FE9F-A792-0D4C-4446-55FB20CBECAB}"/>
+              </a:ext>
+            </a:extLst>
+          </p:cNvPr>
+          <p:cNvSpPr txBox="1"/>
+          <p:nvPr/>
+        </p:nvSpPr>
+        <p:spPr>
+          <a:xfrm>
+            <a:off x="9081035" y="73914"/>
+            <a:ext cx="2378867" cy="292388"/>
+          </a:xfrm>
+          <a:prstGeom prst="rect">
+            <a:avLst/>
+          </a:prstGeom>
+          <a:noFill/>
+        </p:spPr>
+        <p:txBody>
+          <a:bodyPr wrap="square" rtlCol="0">
+            <a:spAutoFit/>
+          </a:bodyPr>
+          <a:lstStyle/>
+          <a:p>
+            <a:pPr algn="ctr"/>
+            <a:r>
+              <a:rPr lang="fr-FR" sz="1300" b="1" dirty="0">
+                <a:solidFill>
+                  <a:schemeClr val="bg1"/>
+                </a:solidFill>
+              </a:rPr>
+              <a:t>TOP MARGE SUB-CATEGORY</a:t>
+            </a:r>
+          </a:p>
+        </p:txBody>
+      </p:sp>
+      <p:sp>
+        <p:nvSpPr>
+          <p:cNvPr id="30" name="ZoneTexte 29">
+            <a:extLst>
+              <a:ext uri="{FF2B5EF4-FFF2-40B4-BE49-F238E27FC236}">
+                <a16:creationId xmlns:a16="http://schemas.microsoft.com/office/drawing/2014/main" id="{59D3E17C-0A25-C944-7CE3-F275163F1114}"/>
+              </a:ext>
+            </a:extLst>
+          </p:cNvPr>
+          <p:cNvSpPr txBox="1"/>
+          <p:nvPr/>
+        </p:nvSpPr>
+        <p:spPr>
+          <a:xfrm>
+            <a:off x="3359851" y="73914"/>
+            <a:ext cx="2378867" cy="292388"/>
+          </a:xfrm>
+          <a:prstGeom prst="rect">
+            <a:avLst/>
+          </a:prstGeom>
+          <a:noFill/>
+        </p:spPr>
+        <p:txBody>
+          <a:bodyPr wrap="square" rtlCol="0">
+            <a:spAutoFit/>
+          </a:bodyPr>
+          <a:lstStyle/>
+          <a:p>
+            <a:pPr algn="ctr"/>
+            <a:r>
+              <a:rPr lang="fr-FR" sz="1300" b="1" dirty="0">
+                <a:solidFill>
+                  <a:schemeClr val="bg1"/>
+                </a:solidFill>
+              </a:rPr>
+              <a:t>TOP QUANTITY SUB-CATEGORY</a:t>
+            </a:r>
+          </a:p>
+        </p:txBody>
+      </p:sp>
+      <p:pic>
+        <p:nvPicPr>
+          <p:cNvPr id="32" name="Graphique 31" descr="Trophée">
+            <a:extLst>
+              <a:ext uri="{FF2B5EF4-FFF2-40B4-BE49-F238E27FC236}">
+                <a16:creationId xmlns:a16="http://schemas.microsoft.com/office/drawing/2014/main" id="{D65424CB-AB80-6A46-0103-A8B1B947857C}"/>
+              </a:ext>
+            </a:extLst>
+          </p:cNvPr>
+          <p:cNvPicPr>
+            <a:picLocks noChangeAspect="1"/>
+          </p:cNvPicPr>
+          <p:nvPr/>
+        </p:nvPicPr>
+        <p:blipFill>
+          <a:blip r:embed="rId2">
+            <a:extLst>
+              <a:ext uri="{96DAC541-7B7A-43D3-8B79-37D633B846F1}">
+                <asvg:svgBlip xmlns:asvg="http://schemas.microsoft.com/office/drawing/2016/SVG/main" r:embed="rId3"/>
+              </a:ext>
+            </a:extLst>
+          </a:blip>
+          <a:stretch>
+            <a:fillRect/>
+          </a:stretch>
+        </p:blipFill>
+        <p:spPr>
+          <a:xfrm>
+            <a:off x="998086" y="207633"/>
+            <a:ext cx="707887" cy="707887"/>
+          </a:xfrm>
+          <a:prstGeom prst="rect">
+            <a:avLst/>
+          </a:prstGeom>
+        </p:spPr>
+      </p:pic>
+      <p:sp>
+        <p:nvSpPr>
+          <p:cNvPr id="33" name="ZoneTexte 32">
+            <a:extLst>
+              <a:ext uri="{FF2B5EF4-FFF2-40B4-BE49-F238E27FC236}">
+                <a16:creationId xmlns:a16="http://schemas.microsoft.com/office/drawing/2014/main" id="{7D885086-4D23-0585-521B-47FAC46E00E6}"/>
+              </a:ext>
+            </a:extLst>
+          </p:cNvPr>
+          <p:cNvSpPr txBox="1"/>
+          <p:nvPr/>
+        </p:nvSpPr>
+        <p:spPr>
+          <a:xfrm>
+            <a:off x="1206847" y="241315"/>
+            <a:ext cx="256513" cy="369332"/>
+          </a:xfrm>
+          <a:prstGeom prst="rect">
+            <a:avLst/>
+          </a:prstGeom>
+          <a:noFill/>
+        </p:spPr>
+        <p:txBody>
+          <a:bodyPr wrap="square" rtlCol="0">
+            <a:spAutoFit/>
+          </a:bodyPr>
+          <a:lstStyle/>
+          <a:p>
+            <a:r>
+              <a:rPr lang="fr-FR" b="1" dirty="0">
+                <a:solidFill>
+                  <a:schemeClr val="bg1"/>
+                </a:solidFill>
+              </a:rPr>
+              <a:t>1</a:t>
+            </a:r>
+          </a:p>
+        </p:txBody>
+      </p:sp>
+      <p:sp>
+        <p:nvSpPr>
+          <p:cNvPr id="36" name="Rectangle 35">
+            <a:extLst>
+              <a:ext uri="{FF2B5EF4-FFF2-40B4-BE49-F238E27FC236}">
+                <a16:creationId xmlns:a16="http://schemas.microsoft.com/office/drawing/2014/main" id="{6BB99794-6756-2505-919A-22E4875C8BB4}"/>
+              </a:ext>
+            </a:extLst>
+          </p:cNvPr>
+          <p:cNvSpPr/>
+          <p:nvPr/>
+        </p:nvSpPr>
+        <p:spPr>
+          <a:xfrm>
+            <a:off x="1057492" y="1529916"/>
+            <a:ext cx="1897630" cy="1940648"/>
+          </a:xfrm>
+          <a:prstGeom prst="rect">
+            <a:avLst/>
+          </a:prstGeom>
+          <a:noFill/>
+          <a:ln w="25400">
+            <a:solidFill>
+              <a:srgbClr val="0070C0"/>
+            </a:solidFill>
+            <a:prstDash val="sysDot"/>
+          </a:ln>
+        </p:spPr>
+        <p:style>
+          <a:lnRef idx="2">
+            <a:schemeClr val="accent1">
+              <a:shade val="15000"/>
+            </a:schemeClr>
+          </a:lnRef>
+          <a:fillRef idx="1">
+            <a:schemeClr val="accent1"/>
+          </a:fillRef>
+          <a:effectRef idx="0">
+            <a:schemeClr val="accent1"/>
+          </a:effectRef>
+          <a:fontRef idx="minor">
+            <a:schemeClr val="lt1"/>
+          </a:fontRef>
+        </p:style>
+        <p:txBody>
+          <a:bodyPr rtlCol="0" anchor="ctr"/>
+          <a:lstStyle/>
+          <a:p>
+            <a:pPr algn="ctr"/>
+            <a:endParaRPr lang="fr-FR"/>
+          </a:p>
+        </p:txBody>
+      </p:sp>
+      <p:sp>
+        <p:nvSpPr>
+          <p:cNvPr id="43" name="ZoneTexte 42">
+            <a:extLst>
+              <a:ext uri="{FF2B5EF4-FFF2-40B4-BE49-F238E27FC236}">
+                <a16:creationId xmlns:a16="http://schemas.microsoft.com/office/drawing/2014/main" id="{85D4076E-6669-5427-880D-24C00976443D}"/>
+              </a:ext>
+            </a:extLst>
+          </p:cNvPr>
+          <p:cNvSpPr txBox="1"/>
+          <p:nvPr/>
+        </p:nvSpPr>
+        <p:spPr>
+          <a:xfrm>
+            <a:off x="782851" y="2046848"/>
+            <a:ext cx="2378867" cy="292388"/>
+          </a:xfrm>
+          <a:prstGeom prst="rect">
+            <a:avLst/>
+          </a:prstGeom>
+          <a:noFill/>
+        </p:spPr>
+        <p:txBody>
+          <a:bodyPr wrap="square" rtlCol="0">
+            <a:spAutoFit/>
+          </a:bodyPr>
+          <a:lstStyle/>
+          <a:p>
+            <a:pPr algn="ctr"/>
+            <a:r>
+              <a:rPr lang="fr-FR" sz="1300" b="1" dirty="0">
+                <a:solidFill>
+                  <a:schemeClr val="bg1"/>
+                </a:solidFill>
+              </a:rPr>
+              <a:t>Profit trend for 2018</a:t>
+            </a:r>
+          </a:p>
+        </p:txBody>
+      </p:sp>
+      <p:cxnSp>
+        <p:nvCxnSpPr>
+          <p:cNvPr id="47" name="Connecteur droit 46">
+            <a:extLst>
+              <a:ext uri="{FF2B5EF4-FFF2-40B4-BE49-F238E27FC236}">
+                <a16:creationId xmlns:a16="http://schemas.microsoft.com/office/drawing/2014/main" id="{77545420-0431-E706-987C-0659538B7B5F}"/>
+              </a:ext>
+            </a:extLst>
+          </p:cNvPr>
+          <p:cNvCxnSpPr>
+            <a:cxnSpLocks/>
+          </p:cNvCxnSpPr>
+          <p:nvPr/>
+        </p:nvCxnSpPr>
+        <p:spPr>
+          <a:xfrm>
+            <a:off x="4635035" y="397475"/>
+            <a:ext cx="0" cy="319498"/>
+          </a:xfrm>
+          <a:prstGeom prst="line">
+            <a:avLst/>
+          </a:prstGeom>
+          <a:ln w="19050">
+            <a:solidFill>
+              <a:schemeClr val="bg1"/>
+            </a:solidFill>
+          </a:ln>
+        </p:spPr>
+        <p:style>
+          <a:lnRef idx="1">
+            <a:schemeClr val="accent1"/>
+          </a:lnRef>
+          <a:fillRef idx="0">
+            <a:schemeClr val="accent1"/>
+          </a:fillRef>
+          <a:effectRef idx="0">
+            <a:schemeClr val="accent1"/>
+          </a:effectRef>
+          <a:fontRef idx="minor">
+            <a:schemeClr val="tx1"/>
+          </a:fontRef>
+        </p:style>
+      </p:cxnSp>
+      <p:cxnSp>
+        <p:nvCxnSpPr>
+          <p:cNvPr id="50" name="Connecteur droit 49">
+            <a:extLst>
+              <a:ext uri="{FF2B5EF4-FFF2-40B4-BE49-F238E27FC236}">
+                <a16:creationId xmlns:a16="http://schemas.microsoft.com/office/drawing/2014/main" id="{487419AE-7E2C-106E-DC7C-CA994FCB9906}"/>
+              </a:ext>
+            </a:extLst>
+          </p:cNvPr>
+          <p:cNvCxnSpPr>
+            <a:cxnSpLocks/>
+          </p:cNvCxnSpPr>
+          <p:nvPr/>
+        </p:nvCxnSpPr>
+        <p:spPr>
+          <a:xfrm>
+            <a:off x="7551944" y="381572"/>
+            <a:ext cx="0" cy="319498"/>
+          </a:xfrm>
+          <a:prstGeom prst="line">
+            <a:avLst/>
+          </a:prstGeom>
+          <a:ln w="19050">
+            <a:solidFill>
+              <a:schemeClr val="bg1"/>
+            </a:solidFill>
+          </a:ln>
+        </p:spPr>
+        <p:style>
+          <a:lnRef idx="1">
+            <a:schemeClr val="accent1"/>
+          </a:lnRef>
+          <a:fillRef idx="0">
+            <a:schemeClr val="accent1"/>
+          </a:fillRef>
+          <a:effectRef idx="0">
+            <a:schemeClr val="accent1"/>
+          </a:effectRef>
+          <a:fontRef idx="minor">
+            <a:schemeClr val="tx1"/>
+          </a:fontRef>
+        </p:style>
+      </p:cxnSp>
+      <p:cxnSp>
+        <p:nvCxnSpPr>
+          <p:cNvPr id="51" name="Connecteur droit 50">
+            <a:extLst>
+              <a:ext uri="{FF2B5EF4-FFF2-40B4-BE49-F238E27FC236}">
+                <a16:creationId xmlns:a16="http://schemas.microsoft.com/office/drawing/2014/main" id="{272F1200-EED6-2031-AA15-3383FDD48EE4}"/>
+              </a:ext>
+            </a:extLst>
+          </p:cNvPr>
+          <p:cNvCxnSpPr>
+            <a:cxnSpLocks/>
+          </p:cNvCxnSpPr>
+          <p:nvPr/>
+        </p:nvCxnSpPr>
+        <p:spPr>
+          <a:xfrm>
+            <a:off x="10466078" y="384614"/>
+            <a:ext cx="0" cy="319498"/>
+          </a:xfrm>
+          <a:prstGeom prst="line">
+            <a:avLst/>
+          </a:prstGeom>
+          <a:ln w="19050">
+            <a:solidFill>
+              <a:schemeClr val="bg1"/>
+            </a:solidFill>
+          </a:ln>
+        </p:spPr>
+        <p:style>
+          <a:lnRef idx="1">
+            <a:schemeClr val="accent1"/>
+          </a:lnRef>
+          <a:fillRef idx="0">
+            <a:schemeClr val="accent1"/>
+          </a:fillRef>
+          <a:effectRef idx="0">
+            <a:schemeClr val="accent1"/>
+          </a:effectRef>
+          <a:fontRef idx="minor">
+            <a:schemeClr val="tx1"/>
+          </a:fontRef>
+        </p:style>
+      </p:cxnSp>
+      <p:sp>
+        <p:nvSpPr>
+          <p:cNvPr id="52" name="ZoneTexte 51">
+            <a:extLst>
+              <a:ext uri="{FF2B5EF4-FFF2-40B4-BE49-F238E27FC236}">
+                <a16:creationId xmlns:a16="http://schemas.microsoft.com/office/drawing/2014/main" id="{B25C300C-8EB6-6D94-6064-AC9B9C39BE04}"/>
+              </a:ext>
+            </a:extLst>
+          </p:cNvPr>
+          <p:cNvSpPr txBox="1"/>
+          <p:nvPr/>
+        </p:nvSpPr>
+        <p:spPr>
+          <a:xfrm>
+            <a:off x="3205243" y="1045695"/>
+            <a:ext cx="2890757" cy="276999"/>
+          </a:xfrm>
+          <a:prstGeom prst="rect">
+            <a:avLst/>
+          </a:prstGeom>
+          <a:noFill/>
+        </p:spPr>
+        <p:txBody>
+          <a:bodyPr wrap="square" rtlCol="0">
+            <a:spAutoFit/>
+          </a:bodyPr>
+          <a:lstStyle/>
+          <a:p>
+            <a:pPr algn="ctr"/>
+            <a:r>
+              <a:rPr lang="en-GB" sz="1200" b="1" dirty="0">
+                <a:solidFill>
+                  <a:schemeClr val="bg1"/>
+                </a:solidFill>
+              </a:rPr>
+              <a:t>Sales, Profit &amp; Quantity by Category</a:t>
+            </a:r>
+            <a:endParaRPr lang="fr-FR" sz="1200" b="1" dirty="0">
+              <a:solidFill>
+                <a:schemeClr val="bg1"/>
+              </a:solidFill>
+            </a:endParaRPr>
+          </a:p>
+        </p:txBody>
+      </p:sp>
+      <p:sp>
+        <p:nvSpPr>
+          <p:cNvPr id="53" name="ZoneTexte 52">
+            <a:extLst>
+              <a:ext uri="{FF2B5EF4-FFF2-40B4-BE49-F238E27FC236}">
+                <a16:creationId xmlns:a16="http://schemas.microsoft.com/office/drawing/2014/main" id="{FD371479-6145-9125-CBFC-A8C4252C0007}"/>
+              </a:ext>
+            </a:extLst>
+          </p:cNvPr>
+          <p:cNvSpPr txBox="1"/>
+          <p:nvPr/>
+        </p:nvSpPr>
+        <p:spPr>
+          <a:xfrm>
+            <a:off x="6346122" y="1045694"/>
+            <a:ext cx="5397914" cy="276999"/>
+          </a:xfrm>
+          <a:prstGeom prst="rect">
+            <a:avLst/>
+          </a:prstGeom>
+          <a:noFill/>
+        </p:spPr>
+        <p:txBody>
+          <a:bodyPr wrap="square" rtlCol="0">
+            <a:spAutoFit/>
+          </a:bodyPr>
+          <a:lstStyle/>
+          <a:p>
+            <a:pPr algn="ctr"/>
+            <a:r>
+              <a:rPr lang="en-GB" sz="1200" b="1" dirty="0">
+                <a:solidFill>
+                  <a:schemeClr val="bg1"/>
+                </a:solidFill>
+              </a:rPr>
+              <a:t>Profit Distribution &amp; Cumulative % by Sub-Category – PARETO ANALYSIS</a:t>
+            </a:r>
+            <a:endParaRPr lang="fr-FR" sz="1200" b="1" dirty="0">
+              <a:solidFill>
+                <a:schemeClr val="bg1"/>
+              </a:solidFill>
+            </a:endParaRPr>
+          </a:p>
+        </p:txBody>
+      </p:sp>
+      <p:sp>
+        <p:nvSpPr>
+          <p:cNvPr id="55" name="ZoneTexte 54">
+            <a:extLst>
+              <a:ext uri="{FF2B5EF4-FFF2-40B4-BE49-F238E27FC236}">
+                <a16:creationId xmlns:a16="http://schemas.microsoft.com/office/drawing/2014/main" id="{FBE8C0F4-FFB3-67EC-1849-A07343993010}"/>
+              </a:ext>
+            </a:extLst>
+          </p:cNvPr>
+          <p:cNvSpPr txBox="1"/>
+          <p:nvPr/>
+        </p:nvSpPr>
+        <p:spPr>
+          <a:xfrm>
+            <a:off x="869028" y="4002918"/>
+            <a:ext cx="2890757" cy="276999"/>
+          </a:xfrm>
+          <a:prstGeom prst="rect">
+            <a:avLst/>
+          </a:prstGeom>
+          <a:noFill/>
+        </p:spPr>
+        <p:txBody>
+          <a:bodyPr wrap="square" rtlCol="0">
+            <a:spAutoFit/>
+          </a:bodyPr>
+          <a:lstStyle/>
+          <a:p>
+            <a:pPr algn="ctr"/>
+            <a:r>
+              <a:rPr lang="en-GB" sz="1200" b="1" dirty="0">
+                <a:solidFill>
+                  <a:schemeClr val="bg1"/>
+                </a:solidFill>
+              </a:rPr>
+              <a:t>Monthly Profit by Category</a:t>
+            </a:r>
+            <a:endParaRPr lang="fr-FR" sz="1200" b="1" dirty="0">
+              <a:solidFill>
+                <a:schemeClr val="bg1"/>
+              </a:solidFill>
+            </a:endParaRPr>
+          </a:p>
+        </p:txBody>
+      </p:sp>
+      <p:sp>
+        <p:nvSpPr>
+          <p:cNvPr id="56" name="ZoneTexte 55">
+            <a:extLst>
+              <a:ext uri="{FF2B5EF4-FFF2-40B4-BE49-F238E27FC236}">
+                <a16:creationId xmlns:a16="http://schemas.microsoft.com/office/drawing/2014/main" id="{5A81AB01-B811-1669-A25C-86D1E1A3950D}"/>
+              </a:ext>
+            </a:extLst>
+          </p:cNvPr>
+          <p:cNvSpPr txBox="1"/>
+          <p:nvPr/>
+        </p:nvSpPr>
+        <p:spPr>
+          <a:xfrm>
+            <a:off x="4125072" y="4010857"/>
+            <a:ext cx="2890757" cy="276999"/>
+          </a:xfrm>
+          <a:prstGeom prst="rect">
+            <a:avLst/>
+          </a:prstGeom>
+          <a:noFill/>
+        </p:spPr>
+        <p:txBody>
+          <a:bodyPr wrap="square" rtlCol="0">
+            <a:spAutoFit/>
+          </a:bodyPr>
+          <a:lstStyle/>
+          <a:p>
+            <a:pPr algn="ctr"/>
+            <a:r>
+              <a:rPr lang="en-GB" sz="1200" b="1" dirty="0">
+                <a:solidFill>
+                  <a:schemeClr val="bg1"/>
+                </a:solidFill>
+              </a:rPr>
+              <a:t>Profit vs Quantity by Sub-Category</a:t>
+            </a:r>
+            <a:endParaRPr lang="fr-FR" sz="1200" b="1" dirty="0">
+              <a:solidFill>
+                <a:schemeClr val="bg1"/>
+              </a:solidFill>
+            </a:endParaRPr>
+          </a:p>
+        </p:txBody>
+      </p:sp>
+      <p:sp>
+        <p:nvSpPr>
+          <p:cNvPr id="60" name="ZoneTexte 59">
+            <a:extLst>
+              <a:ext uri="{FF2B5EF4-FFF2-40B4-BE49-F238E27FC236}">
+                <a16:creationId xmlns:a16="http://schemas.microsoft.com/office/drawing/2014/main" id="{C11E12D3-8DCF-CCF7-676B-68B46DA9B757}"/>
+              </a:ext>
+            </a:extLst>
+          </p:cNvPr>
+          <p:cNvSpPr txBox="1"/>
+          <p:nvPr/>
+        </p:nvSpPr>
+        <p:spPr>
+          <a:xfrm>
+            <a:off x="7738293" y="4010857"/>
+            <a:ext cx="3721609" cy="276999"/>
+          </a:xfrm>
+          <a:prstGeom prst="rect">
+            <a:avLst/>
+          </a:prstGeom>
+          <a:noFill/>
+        </p:spPr>
+        <p:txBody>
+          <a:bodyPr wrap="square" rtlCol="0">
+            <a:spAutoFit/>
+          </a:bodyPr>
+          <a:lstStyle/>
+          <a:p>
+            <a:pPr algn="ctr"/>
+            <a:r>
+              <a:rPr lang="en-GB" sz="1200" b="1" dirty="0">
+                <a:solidFill>
+                  <a:schemeClr val="bg1"/>
+                </a:solidFill>
+              </a:rPr>
+              <a:t>Quantity Breakdown by Category and Sub-Category</a:t>
+            </a:r>
+            <a:endParaRPr lang="fr-FR" sz="1200" b="1" dirty="0">
+              <a:solidFill>
+                <a:schemeClr val="bg1"/>
+              </a:solidFill>
+            </a:endParaRPr>
+          </a:p>
+        </p:txBody>
+      </p:sp>
+      <p:sp>
+        <p:nvSpPr>
+          <p:cNvPr id="65" name="Rectangle : avec coins arrondis en diagonale 64">
+            <a:extLst>
+              <a:ext uri="{FF2B5EF4-FFF2-40B4-BE49-F238E27FC236}">
+                <a16:creationId xmlns:a16="http://schemas.microsoft.com/office/drawing/2014/main" id="{F998BC33-05A5-F24B-CF21-E517F206B91C}"/>
+              </a:ext>
+            </a:extLst>
+          </p:cNvPr>
+          <p:cNvSpPr/>
+          <p:nvPr/>
+        </p:nvSpPr>
+        <p:spPr>
+          <a:xfrm>
+            <a:off x="1718570" y="411378"/>
+            <a:ext cx="1218173" cy="364802"/>
+          </a:xfrm>
+          <a:prstGeom prst="round2DiagRect">
+            <a:avLst>
+              <a:gd name="adj1" fmla="val 41985"/>
+              <a:gd name="adj2" fmla="val 0"/>
+            </a:avLst>
+          </a:prstGeom>
+          <a:solidFill>
+            <a:srgbClr val="FEBB05">
+              <a:alpha val="50000"/>
+            </a:srgbClr>
+          </a:solidFill>
+          <a:ln>
+            <a:noFill/>
+          </a:ln>
+        </p:spPr>
+        <p:style>
+          <a:lnRef idx="2">
+            <a:schemeClr val="accent1">
+              <a:shade val="15000"/>
+            </a:schemeClr>
+          </a:lnRef>
+          <a:fillRef idx="1">
+            <a:schemeClr val="accent1"/>
+          </a:fillRef>
+          <a:effectRef idx="0">
+            <a:schemeClr val="accent1"/>
+          </a:effectRef>
+          <a:fontRef idx="minor">
+            <a:schemeClr val="lt1"/>
+          </a:fontRef>
+        </p:style>
+        <p:txBody>
+          <a:bodyPr rtlCol="0" anchor="ctr"/>
+          <a:lstStyle/>
+          <a:p>
+            <a:pPr algn="ctr"/>
+            <a:r>
+              <a:rPr lang="fr-FR" b="1" dirty="0"/>
+              <a:t>WINNERS</a:t>
+            </a:r>
+          </a:p>
+        </p:txBody>
+      </p:sp>
+    </p:spTree>
+    <p:extLst>
+      <p:ext uri="{BB962C8B-B14F-4D97-AF65-F5344CB8AC3E}">
+        <p14:creationId xmlns:p14="http://schemas.microsoft.com/office/powerpoint/2010/main" val="2954438705"/>
+      </p:ext>
+    </p:extLst>
+  </p:cSld>
+  <p:clrMapOvr>
+    <a:masterClrMapping/>
+  </p:clrMapOvr>
+</p:sld>
+</file>
+
 <file path=ppt/theme/theme1.xml><?xml version="1.0" encoding="utf-8"?>
 <a:theme xmlns:a="http://schemas.openxmlformats.org/drawingml/2006/main" name="Thème Office">
   <a:themeElements>

</xml_diff>